<commit_message>
Updated code for figures
</commit_message>
<xml_diff>
--- a/figs/fig_MCMCbs_comparison.pptx
+++ b/figs/fig_MCMCbs_comparison.pptx
@@ -2,12 +2,12 @@
 <file path=ppt/presentation.xml><?xml version="1.0" encoding="utf-8"?>
 <p:presentation xmlns:a="http://schemas.openxmlformats.org/drawingml/2006/main" xmlns:r="http://schemas.openxmlformats.org/officeDocument/2006/relationships" xmlns:p="http://schemas.openxmlformats.org/presentationml/2006/main" saveSubsetFonts="1" autoCompressPictures="0">
   <p:sldMasterIdLst>
-    <p:sldMasterId id="2147483660" r:id="rId1"/>
+    <p:sldMasterId id="2147483672" r:id="rId1"/>
   </p:sldMasterIdLst>
   <p:sldIdLst>
     <p:sldId id="256" r:id="rId2"/>
   </p:sldIdLst>
-  <p:sldSz cx="17373600" cy="10972800"/>
+  <p:sldSz cx="17373600" cy="11430000"/>
   <p:notesSz cx="6858000" cy="9144000"/>
   <p:defaultTextStyle>
     <a:defPPr>
@@ -115,8 +115,7 @@
 <file path=ppt/revisionInfo.xml><?xml version="1.0" encoding="utf-8"?>
 <p1510:revInfo xmlns:a="http://schemas.openxmlformats.org/drawingml/2006/main" xmlns:r="http://schemas.openxmlformats.org/officeDocument/2006/relationships" xmlns:p1510="http://schemas.microsoft.com/office/powerpoint/2015/10/main">
   <p1510:revLst>
-    <p1510:client id="{8550181F-EA8B-2C47-9578-58D8CBC7D6F0}" v="6" dt="2025-05-09T21:33:37.684"/>
-    <p1510:client id="{B0F65F1A-47D9-0541-A4E5-BE40BC898954}" v="3" dt="2025-05-10T02:52:33.487"/>
+    <p1510:client id="{B0F65F1A-47D9-0541-A4E5-BE40BC898954}" v="13" dt="2025-05-23T03:31:21.265"/>
   </p1510:revLst>
 </p1510:revInfo>
 </file>
@@ -189,43 +188,211 @@
   </pc:docChgLst>
   <pc:docChgLst>
     <pc:chgData name="Barkasi, Michael" userId="604489e9-c8b5-4a18-ae0d-3a3e29c44efc" providerId="ADAL" clId="{B0F65F1A-47D9-0541-A4E5-BE40BC898954}"/>
-    <pc:docChg chg="modSld">
-      <pc:chgData name="Barkasi, Michael" userId="604489e9-c8b5-4a18-ae0d-3a3e29c44efc" providerId="ADAL" clId="{B0F65F1A-47D9-0541-A4E5-BE40BC898954}" dt="2025-05-10T02:52:56.233" v="38" actId="14100"/>
+    <pc:docChg chg="undo custSel modSld modMainMaster">
+      <pc:chgData name="Barkasi, Michael" userId="604489e9-c8b5-4a18-ae0d-3a3e29c44efc" providerId="ADAL" clId="{B0F65F1A-47D9-0541-A4E5-BE40BC898954}" dt="2025-05-23T03:31:47.114" v="89" actId="208"/>
       <pc:docMkLst>
         <pc:docMk/>
       </pc:docMkLst>
-      <pc:sldChg chg="addSp modSp mod">
-        <pc:chgData name="Barkasi, Michael" userId="604489e9-c8b5-4a18-ae0d-3a3e29c44efc" providerId="ADAL" clId="{B0F65F1A-47D9-0541-A4E5-BE40BC898954}" dt="2025-05-10T02:52:56.233" v="38" actId="14100"/>
+      <pc:sldChg chg="addSp delSp modSp mod">
+        <pc:chgData name="Barkasi, Michael" userId="604489e9-c8b5-4a18-ae0d-3a3e29c44efc" providerId="ADAL" clId="{B0F65F1A-47D9-0541-A4E5-BE40BC898954}" dt="2025-05-23T03:31:47.114" v="89" actId="208"/>
         <pc:sldMkLst>
           <pc:docMk/>
           <pc:sldMk cId="420047761" sldId="256"/>
         </pc:sldMkLst>
+        <pc:spChg chg="mod">
+          <ac:chgData name="Barkasi, Michael" userId="604489e9-c8b5-4a18-ae0d-3a3e29c44efc" providerId="ADAL" clId="{B0F65F1A-47D9-0541-A4E5-BE40BC898954}" dt="2025-05-23T03:31:21.265" v="84" actId="164"/>
+          <ac:spMkLst>
+            <pc:docMk/>
+            <pc:sldMk cId="420047761" sldId="256"/>
+            <ac:spMk id="2" creationId="{BD2123D2-E6F0-499C-B074-B87DAF1CAF17}"/>
+          </ac:spMkLst>
+        </pc:spChg>
+        <pc:spChg chg="mod">
+          <ac:chgData name="Barkasi, Michael" userId="604489e9-c8b5-4a18-ae0d-3a3e29c44efc" providerId="ADAL" clId="{B0F65F1A-47D9-0541-A4E5-BE40BC898954}" dt="2025-05-23T03:31:21.265" v="84" actId="164"/>
+          <ac:spMkLst>
+            <pc:docMk/>
+            <pc:sldMk cId="420047761" sldId="256"/>
+            <ac:spMk id="3" creationId="{7CBAADB1-5585-736D-563A-3E93AD096F15}"/>
+          </ac:spMkLst>
+        </pc:spChg>
+        <pc:spChg chg="mod">
+          <ac:chgData name="Barkasi, Michael" userId="604489e9-c8b5-4a18-ae0d-3a3e29c44efc" providerId="ADAL" clId="{B0F65F1A-47D9-0541-A4E5-BE40BC898954}" dt="2025-05-23T03:31:21.265" v="84" actId="164"/>
+          <ac:spMkLst>
+            <pc:docMk/>
+            <pc:sldMk cId="420047761" sldId="256"/>
+            <ac:spMk id="4" creationId="{1995DD2D-D210-0BD3-C0BF-88970E4275EB}"/>
+          </ac:spMkLst>
+        </pc:spChg>
+        <pc:spChg chg="mod">
+          <ac:chgData name="Barkasi, Michael" userId="604489e9-c8b5-4a18-ae0d-3a3e29c44efc" providerId="ADAL" clId="{B0F65F1A-47D9-0541-A4E5-BE40BC898954}" dt="2025-05-23T03:31:21.265" v="84" actId="164"/>
+          <ac:spMkLst>
+            <pc:docMk/>
+            <pc:sldMk cId="420047761" sldId="256"/>
+            <ac:spMk id="6" creationId="{C89F8798-F60C-D3ED-DA8A-3F1C07AF6A4F}"/>
+          </ac:spMkLst>
+        </pc:spChg>
+        <pc:spChg chg="mod">
+          <ac:chgData name="Barkasi, Michael" userId="604489e9-c8b5-4a18-ae0d-3a3e29c44efc" providerId="ADAL" clId="{B0F65F1A-47D9-0541-A4E5-BE40BC898954}" dt="2025-05-23T03:31:21.265" v="84" actId="164"/>
+          <ac:spMkLst>
+            <pc:docMk/>
+            <pc:sldMk cId="420047761" sldId="256"/>
+            <ac:spMk id="7" creationId="{1CC9737E-0380-0DC8-8278-9FF97AF9C833}"/>
+          </ac:spMkLst>
+        </pc:spChg>
+        <pc:spChg chg="mod">
+          <ac:chgData name="Barkasi, Michael" userId="604489e9-c8b5-4a18-ae0d-3a3e29c44efc" providerId="ADAL" clId="{B0F65F1A-47D9-0541-A4E5-BE40BC898954}" dt="2025-05-23T03:31:21.265" v="84" actId="164"/>
+          <ac:spMkLst>
+            <pc:docMk/>
+            <pc:sldMk cId="420047761" sldId="256"/>
+            <ac:spMk id="8" creationId="{2ACA91A2-C9D2-A85D-BA1B-166C6D4B90CB}"/>
+          </ac:spMkLst>
+        </pc:spChg>
         <pc:spChg chg="add mod">
-          <ac:chgData name="Barkasi, Michael" userId="604489e9-c8b5-4a18-ae0d-3a3e29c44efc" providerId="ADAL" clId="{B0F65F1A-47D9-0541-A4E5-BE40BC898954}" dt="2025-05-10T02:52:18.027" v="31" actId="1076"/>
+          <ac:chgData name="Barkasi, Michael" userId="604489e9-c8b5-4a18-ae0d-3a3e29c44efc" providerId="ADAL" clId="{B0F65F1A-47D9-0541-A4E5-BE40BC898954}" dt="2025-05-23T03:31:47.114" v="89" actId="208"/>
+          <ac:spMkLst>
+            <pc:docMk/>
+            <pc:sldMk cId="420047761" sldId="256"/>
+            <ac:spMk id="9" creationId="{81817CE1-B27E-4CC4-7DE1-0A00CF378C94}"/>
+          </ac:spMkLst>
+        </pc:spChg>
+        <pc:spChg chg="add del mod">
+          <ac:chgData name="Barkasi, Michael" userId="604489e9-c8b5-4a18-ae0d-3a3e29c44efc" providerId="ADAL" clId="{B0F65F1A-47D9-0541-A4E5-BE40BC898954}" dt="2025-05-23T03:25:59.605" v="79" actId="478"/>
           <ac:spMkLst>
             <pc:docMk/>
             <pc:sldMk cId="420047761" sldId="256"/>
             <ac:spMk id="19" creationId="{6A711244-0850-75E9-5AAA-47445E71C37E}"/>
           </ac:spMkLst>
         </pc:spChg>
-        <pc:picChg chg="add mod">
-          <ac:chgData name="Barkasi, Michael" userId="604489e9-c8b5-4a18-ae0d-3a3e29c44efc" providerId="ADAL" clId="{B0F65F1A-47D9-0541-A4E5-BE40BC898954}" dt="2025-05-10T02:52:40.060" v="34" actId="1076"/>
+        <pc:spChg chg="mod">
+          <ac:chgData name="Barkasi, Michael" userId="604489e9-c8b5-4a18-ae0d-3a3e29c44efc" providerId="ADAL" clId="{B0F65F1A-47D9-0541-A4E5-BE40BC898954}" dt="2025-05-23T03:31:00.231" v="82"/>
+          <ac:spMkLst>
+            <pc:docMk/>
+            <pc:sldMk cId="420047761" sldId="256"/>
+            <ac:spMk id="28" creationId="{EE6EEDC4-5E6F-0A18-DA21-83AC8A36BDA2}"/>
+          </ac:spMkLst>
+        </pc:spChg>
+        <pc:spChg chg="mod">
+          <ac:chgData name="Barkasi, Michael" userId="604489e9-c8b5-4a18-ae0d-3a3e29c44efc" providerId="ADAL" clId="{B0F65F1A-47D9-0541-A4E5-BE40BC898954}" dt="2025-05-23T03:31:00.231" v="82"/>
+          <ac:spMkLst>
+            <pc:docMk/>
+            <pc:sldMk cId="420047761" sldId="256"/>
+            <ac:spMk id="29" creationId="{EDCEE873-4003-AFC8-5B21-0A4F6CE8B0B4}"/>
+          </ac:spMkLst>
+        </pc:spChg>
+        <pc:spChg chg="mod">
+          <ac:chgData name="Barkasi, Michael" userId="604489e9-c8b5-4a18-ae0d-3a3e29c44efc" providerId="ADAL" clId="{B0F65F1A-47D9-0541-A4E5-BE40BC898954}" dt="2025-05-23T03:31:00.231" v="82"/>
+          <ac:spMkLst>
+            <pc:docMk/>
+            <pc:sldMk cId="420047761" sldId="256"/>
+            <ac:spMk id="31" creationId="{E66B3103-4C44-E2A1-FBEA-6CA1E15E6AA4}"/>
+          </ac:spMkLst>
+        </pc:spChg>
+        <pc:spChg chg="mod">
+          <ac:chgData name="Barkasi, Michael" userId="604489e9-c8b5-4a18-ae0d-3a3e29c44efc" providerId="ADAL" clId="{B0F65F1A-47D9-0541-A4E5-BE40BC898954}" dt="2025-05-23T03:31:00.231" v="82"/>
+          <ac:spMkLst>
+            <pc:docMk/>
+            <pc:sldMk cId="420047761" sldId="256"/>
+            <ac:spMk id="32" creationId="{97BB1EA6-3ECB-6D66-AA14-D9EB6B559A52}"/>
+          </ac:spMkLst>
+        </pc:spChg>
+        <pc:grpChg chg="add mod">
+          <ac:chgData name="Barkasi, Michael" userId="604489e9-c8b5-4a18-ae0d-3a3e29c44efc" providerId="ADAL" clId="{B0F65F1A-47D9-0541-A4E5-BE40BC898954}" dt="2025-05-23T03:31:26.932" v="85" actId="1076"/>
+          <ac:grpSpMkLst>
+            <pc:docMk/>
+            <pc:sldMk cId="420047761" sldId="256"/>
+            <ac:grpSpMk id="5" creationId="{7E54E683-1AA7-5516-1B7E-A1CD186BBF90}"/>
+          </ac:grpSpMkLst>
+        </pc:grpChg>
+        <pc:grpChg chg="del">
+          <ac:chgData name="Barkasi, Michael" userId="604489e9-c8b5-4a18-ae0d-3a3e29c44efc" providerId="ADAL" clId="{B0F65F1A-47D9-0541-A4E5-BE40BC898954}" dt="2025-05-23T03:20:17.491" v="39" actId="478"/>
+          <ac:grpSpMkLst>
+            <pc:docMk/>
+            <pc:sldMk cId="420047761" sldId="256"/>
+            <ac:grpSpMk id="18" creationId="{B69E6A22-7B8C-0FC4-59AE-DC5DEABABF56}"/>
+          </ac:grpSpMkLst>
+        </pc:grpChg>
+        <pc:grpChg chg="mod">
+          <ac:chgData name="Barkasi, Michael" userId="604489e9-c8b5-4a18-ae0d-3a3e29c44efc" providerId="ADAL" clId="{B0F65F1A-47D9-0541-A4E5-BE40BC898954}" dt="2025-05-23T03:31:21.265" v="84" actId="164"/>
+          <ac:grpSpMkLst>
+            <pc:docMk/>
+            <pc:sldMk cId="420047761" sldId="256"/>
+            <ac:grpSpMk id="33" creationId="{6669CF29-2FC9-85D2-5EFA-3B278C497365}"/>
+          </ac:grpSpMkLst>
+        </pc:grpChg>
+        <pc:grpChg chg="mod">
+          <ac:chgData name="Barkasi, Michael" userId="604489e9-c8b5-4a18-ae0d-3a3e29c44efc" providerId="ADAL" clId="{B0F65F1A-47D9-0541-A4E5-BE40BC898954}" dt="2025-05-23T03:31:21.265" v="84" actId="164"/>
+          <ac:grpSpMkLst>
+            <pc:docMk/>
+            <pc:sldMk cId="420047761" sldId="256"/>
+            <ac:grpSpMk id="34" creationId="{D7CA7851-95BC-A4FD-8FA8-AA91936BA621}"/>
+          </ac:grpSpMkLst>
+        </pc:grpChg>
+        <pc:picChg chg="add del mod">
+          <ac:chgData name="Barkasi, Michael" userId="604489e9-c8b5-4a18-ae0d-3a3e29c44efc" providerId="ADAL" clId="{B0F65F1A-47D9-0541-A4E5-BE40BC898954}" dt="2025-05-23T03:25:31.357" v="75" actId="478"/>
           <ac:picMkLst>
             <pc:docMk/>
             <pc:sldMk cId="420047761" sldId="256"/>
             <ac:picMk id="12" creationId="{3EA8482E-177C-C72D-FB2D-8770CEF2A8A8}"/>
           </ac:picMkLst>
         </pc:picChg>
-        <pc:cxnChg chg="add mod">
-          <ac:chgData name="Barkasi, Michael" userId="604489e9-c8b5-4a18-ae0d-3a3e29c44efc" providerId="ADAL" clId="{B0F65F1A-47D9-0541-A4E5-BE40BC898954}" dt="2025-05-10T02:52:47.472" v="36" actId="14100"/>
+        <pc:picChg chg="add del mod">
+          <ac:chgData name="Barkasi, Michael" userId="604489e9-c8b5-4a18-ae0d-3a3e29c44efc" providerId="ADAL" clId="{B0F65F1A-47D9-0541-A4E5-BE40BC898954}" dt="2025-05-23T03:21:20.594" v="46" actId="478"/>
+          <ac:picMkLst>
+            <pc:docMk/>
+            <pc:sldMk cId="420047761" sldId="256"/>
+            <ac:picMk id="13" creationId="{FC0DBE5E-CB8C-8D21-0372-2C88E8E2EDE9}"/>
+          </ac:picMkLst>
+        </pc:picChg>
+        <pc:picChg chg="add del mod">
+          <ac:chgData name="Barkasi, Michael" userId="604489e9-c8b5-4a18-ae0d-3a3e29c44efc" providerId="ADAL" clId="{B0F65F1A-47D9-0541-A4E5-BE40BC898954}" dt="2025-05-23T03:21:45.766" v="53" actId="478"/>
+          <ac:picMkLst>
+            <pc:docMk/>
+            <pc:sldMk cId="420047761" sldId="256"/>
+            <ac:picMk id="22" creationId="{49AAE739-F7F0-9FC1-E2F0-6FD46E4788DC}"/>
+          </ac:picMkLst>
+        </pc:picChg>
+        <pc:picChg chg="add mod">
+          <ac:chgData name="Barkasi, Michael" userId="604489e9-c8b5-4a18-ae0d-3a3e29c44efc" providerId="ADAL" clId="{B0F65F1A-47D9-0541-A4E5-BE40BC898954}" dt="2025-05-23T03:31:21.265" v="84" actId="164"/>
+          <ac:picMkLst>
+            <pc:docMk/>
+            <pc:sldMk cId="420047761" sldId="256"/>
+            <ac:picMk id="25" creationId="{0C869B22-4AEF-7F03-A48A-7069BF0FE132}"/>
+          </ac:picMkLst>
+        </pc:picChg>
+        <pc:picChg chg="add del mod modCrop">
+          <ac:chgData name="Barkasi, Michael" userId="604489e9-c8b5-4a18-ae0d-3a3e29c44efc" providerId="ADAL" clId="{B0F65F1A-47D9-0541-A4E5-BE40BC898954}" dt="2025-05-23T03:24:46.822" v="70" actId="478"/>
+          <ac:picMkLst>
+            <pc:docMk/>
+            <pc:sldMk cId="420047761" sldId="256"/>
+            <ac:picMk id="35" creationId="{67573160-6CF9-8909-1A16-E61CB3E3BD78}"/>
+          </ac:picMkLst>
+        </pc:picChg>
+        <pc:picChg chg="add del mod">
+          <ac:chgData name="Barkasi, Michael" userId="604489e9-c8b5-4a18-ae0d-3a3e29c44efc" providerId="ADAL" clId="{B0F65F1A-47D9-0541-A4E5-BE40BC898954}" dt="2025-05-23T03:24:14.540" v="69" actId="478"/>
+          <ac:picMkLst>
+            <pc:docMk/>
+            <pc:sldMk cId="420047761" sldId="256"/>
+            <ac:picMk id="36" creationId="{9C0F9CD9-7CBF-2783-1124-7249D2F0C139}"/>
+          </ac:picMkLst>
+        </pc:picChg>
+        <pc:picChg chg="add mod">
+          <ac:chgData name="Barkasi, Michael" userId="604489e9-c8b5-4a18-ae0d-3a3e29c44efc" providerId="ADAL" clId="{B0F65F1A-47D9-0541-A4E5-BE40BC898954}" dt="2025-05-23T03:31:31.155" v="86" actId="1076"/>
+          <ac:picMkLst>
+            <pc:docMk/>
+            <pc:sldMk cId="420047761" sldId="256"/>
+            <ac:picMk id="38" creationId="{876BEA00-93CC-3E62-C426-5B22BFD78E85}"/>
+          </ac:picMkLst>
+        </pc:picChg>
+        <pc:cxnChg chg="add del mod">
+          <ac:chgData name="Barkasi, Michael" userId="604489e9-c8b5-4a18-ae0d-3a3e29c44efc" providerId="ADAL" clId="{B0F65F1A-47D9-0541-A4E5-BE40BC898954}" dt="2025-05-23T03:26:02.364" v="81" actId="478"/>
           <ac:cxnSpMkLst>
             <pc:docMk/>
             <pc:sldMk cId="420047761" sldId="256"/>
             <ac:cxnSpMk id="16" creationId="{B239EADA-9951-251F-81D4-4A1A88A37949}"/>
           </ac:cxnSpMkLst>
         </pc:cxnChg>
-        <pc:cxnChg chg="add mod">
-          <ac:chgData name="Barkasi, Michael" userId="604489e9-c8b5-4a18-ae0d-3a3e29c44efc" providerId="ADAL" clId="{B0F65F1A-47D9-0541-A4E5-BE40BC898954}" dt="2025-05-10T02:52:56.233" v="38" actId="14100"/>
+        <pc:cxnChg chg="add del mod">
+          <ac:chgData name="Barkasi, Michael" userId="604489e9-c8b5-4a18-ae0d-3a3e29c44efc" providerId="ADAL" clId="{B0F65F1A-47D9-0541-A4E5-BE40BC898954}" dt="2025-05-23T03:26:00.684" v="80" actId="478"/>
           <ac:cxnSpMkLst>
             <pc:docMk/>
             <pc:sldMk cId="420047761" sldId="256"/>
@@ -233,6 +400,280 @@
           </ac:cxnSpMkLst>
         </pc:cxnChg>
       </pc:sldChg>
+      <pc:sldMasterChg chg="modSp modSldLayout">
+        <pc:chgData name="Barkasi, Michael" userId="604489e9-c8b5-4a18-ae0d-3a3e29c44efc" providerId="ADAL" clId="{B0F65F1A-47D9-0541-A4E5-BE40BC898954}" dt="2025-05-23T03:31:00.231" v="82"/>
+        <pc:sldMasterMkLst>
+          <pc:docMk/>
+          <pc:sldMasterMk cId="806875768" sldId="2147483660"/>
+        </pc:sldMasterMkLst>
+        <pc:spChg chg="mod">
+          <ac:chgData name="Barkasi, Michael" userId="604489e9-c8b5-4a18-ae0d-3a3e29c44efc" providerId="ADAL" clId="{B0F65F1A-47D9-0541-A4E5-BE40BC898954}" dt="2025-05-23T03:31:00.231" v="82"/>
+          <ac:spMkLst>
+            <pc:docMk/>
+            <pc:sldMasterMk cId="806875768" sldId="2147483660"/>
+            <ac:spMk id="2" creationId="{00000000-0000-0000-0000-000000000000}"/>
+          </ac:spMkLst>
+        </pc:spChg>
+        <pc:spChg chg="mod">
+          <ac:chgData name="Barkasi, Michael" userId="604489e9-c8b5-4a18-ae0d-3a3e29c44efc" providerId="ADAL" clId="{B0F65F1A-47D9-0541-A4E5-BE40BC898954}" dt="2025-05-23T03:31:00.231" v="82"/>
+          <ac:spMkLst>
+            <pc:docMk/>
+            <pc:sldMasterMk cId="806875768" sldId="2147483660"/>
+            <ac:spMk id="3" creationId="{00000000-0000-0000-0000-000000000000}"/>
+          </ac:spMkLst>
+        </pc:spChg>
+        <pc:spChg chg="mod">
+          <ac:chgData name="Barkasi, Michael" userId="604489e9-c8b5-4a18-ae0d-3a3e29c44efc" providerId="ADAL" clId="{B0F65F1A-47D9-0541-A4E5-BE40BC898954}" dt="2025-05-23T03:31:00.231" v="82"/>
+          <ac:spMkLst>
+            <pc:docMk/>
+            <pc:sldMasterMk cId="806875768" sldId="2147483660"/>
+            <ac:spMk id="4" creationId="{00000000-0000-0000-0000-000000000000}"/>
+          </ac:spMkLst>
+        </pc:spChg>
+        <pc:spChg chg="mod">
+          <ac:chgData name="Barkasi, Michael" userId="604489e9-c8b5-4a18-ae0d-3a3e29c44efc" providerId="ADAL" clId="{B0F65F1A-47D9-0541-A4E5-BE40BC898954}" dt="2025-05-23T03:31:00.231" v="82"/>
+          <ac:spMkLst>
+            <pc:docMk/>
+            <pc:sldMasterMk cId="806875768" sldId="2147483660"/>
+            <ac:spMk id="5" creationId="{00000000-0000-0000-0000-000000000000}"/>
+          </ac:spMkLst>
+        </pc:spChg>
+        <pc:spChg chg="mod">
+          <ac:chgData name="Barkasi, Michael" userId="604489e9-c8b5-4a18-ae0d-3a3e29c44efc" providerId="ADAL" clId="{B0F65F1A-47D9-0541-A4E5-BE40BC898954}" dt="2025-05-23T03:31:00.231" v="82"/>
+          <ac:spMkLst>
+            <pc:docMk/>
+            <pc:sldMasterMk cId="806875768" sldId="2147483660"/>
+            <ac:spMk id="6" creationId="{00000000-0000-0000-0000-000000000000}"/>
+          </ac:spMkLst>
+        </pc:spChg>
+        <pc:sldLayoutChg chg="modSp">
+          <pc:chgData name="Barkasi, Michael" userId="604489e9-c8b5-4a18-ae0d-3a3e29c44efc" providerId="ADAL" clId="{B0F65F1A-47D9-0541-A4E5-BE40BC898954}" dt="2025-05-23T03:31:00.231" v="82"/>
+          <pc:sldLayoutMkLst>
+            <pc:docMk/>
+            <pc:sldMasterMk cId="806875768" sldId="2147483660"/>
+            <pc:sldLayoutMk cId="384000379" sldId="2147483661"/>
+          </pc:sldLayoutMkLst>
+          <pc:spChg chg="mod">
+            <ac:chgData name="Barkasi, Michael" userId="604489e9-c8b5-4a18-ae0d-3a3e29c44efc" providerId="ADAL" clId="{B0F65F1A-47D9-0541-A4E5-BE40BC898954}" dt="2025-05-23T03:31:00.231" v="82"/>
+            <ac:spMkLst>
+              <pc:docMk/>
+              <pc:sldMasterMk cId="806875768" sldId="2147483660"/>
+              <pc:sldLayoutMk cId="384000379" sldId="2147483661"/>
+              <ac:spMk id="2" creationId="{00000000-0000-0000-0000-000000000000}"/>
+            </ac:spMkLst>
+          </pc:spChg>
+          <pc:spChg chg="mod">
+            <ac:chgData name="Barkasi, Michael" userId="604489e9-c8b5-4a18-ae0d-3a3e29c44efc" providerId="ADAL" clId="{B0F65F1A-47D9-0541-A4E5-BE40BC898954}" dt="2025-05-23T03:31:00.231" v="82"/>
+            <ac:spMkLst>
+              <pc:docMk/>
+              <pc:sldMasterMk cId="806875768" sldId="2147483660"/>
+              <pc:sldLayoutMk cId="384000379" sldId="2147483661"/>
+              <ac:spMk id="3" creationId="{00000000-0000-0000-0000-000000000000}"/>
+            </ac:spMkLst>
+          </pc:spChg>
+        </pc:sldLayoutChg>
+        <pc:sldLayoutChg chg="modSp">
+          <pc:chgData name="Barkasi, Michael" userId="604489e9-c8b5-4a18-ae0d-3a3e29c44efc" providerId="ADAL" clId="{B0F65F1A-47D9-0541-A4E5-BE40BC898954}" dt="2025-05-23T03:31:00.231" v="82"/>
+          <pc:sldLayoutMkLst>
+            <pc:docMk/>
+            <pc:sldMasterMk cId="806875768" sldId="2147483660"/>
+            <pc:sldLayoutMk cId="3532096364" sldId="2147483663"/>
+          </pc:sldLayoutMkLst>
+          <pc:spChg chg="mod">
+            <ac:chgData name="Barkasi, Michael" userId="604489e9-c8b5-4a18-ae0d-3a3e29c44efc" providerId="ADAL" clId="{B0F65F1A-47D9-0541-A4E5-BE40BC898954}" dt="2025-05-23T03:31:00.231" v="82"/>
+            <ac:spMkLst>
+              <pc:docMk/>
+              <pc:sldMasterMk cId="806875768" sldId="2147483660"/>
+              <pc:sldLayoutMk cId="3532096364" sldId="2147483663"/>
+              <ac:spMk id="2" creationId="{00000000-0000-0000-0000-000000000000}"/>
+            </ac:spMkLst>
+          </pc:spChg>
+          <pc:spChg chg="mod">
+            <ac:chgData name="Barkasi, Michael" userId="604489e9-c8b5-4a18-ae0d-3a3e29c44efc" providerId="ADAL" clId="{B0F65F1A-47D9-0541-A4E5-BE40BC898954}" dt="2025-05-23T03:31:00.231" v="82"/>
+            <ac:spMkLst>
+              <pc:docMk/>
+              <pc:sldMasterMk cId="806875768" sldId="2147483660"/>
+              <pc:sldLayoutMk cId="3532096364" sldId="2147483663"/>
+              <ac:spMk id="3" creationId="{00000000-0000-0000-0000-000000000000}"/>
+            </ac:spMkLst>
+          </pc:spChg>
+        </pc:sldLayoutChg>
+        <pc:sldLayoutChg chg="modSp">
+          <pc:chgData name="Barkasi, Michael" userId="604489e9-c8b5-4a18-ae0d-3a3e29c44efc" providerId="ADAL" clId="{B0F65F1A-47D9-0541-A4E5-BE40BC898954}" dt="2025-05-23T03:31:00.231" v="82"/>
+          <pc:sldLayoutMkLst>
+            <pc:docMk/>
+            <pc:sldMasterMk cId="806875768" sldId="2147483660"/>
+            <pc:sldLayoutMk cId="1977739395" sldId="2147483664"/>
+          </pc:sldLayoutMkLst>
+          <pc:spChg chg="mod">
+            <ac:chgData name="Barkasi, Michael" userId="604489e9-c8b5-4a18-ae0d-3a3e29c44efc" providerId="ADAL" clId="{B0F65F1A-47D9-0541-A4E5-BE40BC898954}" dt="2025-05-23T03:31:00.231" v="82"/>
+            <ac:spMkLst>
+              <pc:docMk/>
+              <pc:sldMasterMk cId="806875768" sldId="2147483660"/>
+              <pc:sldLayoutMk cId="1977739395" sldId="2147483664"/>
+              <ac:spMk id="3" creationId="{00000000-0000-0000-0000-000000000000}"/>
+            </ac:spMkLst>
+          </pc:spChg>
+          <pc:spChg chg="mod">
+            <ac:chgData name="Barkasi, Michael" userId="604489e9-c8b5-4a18-ae0d-3a3e29c44efc" providerId="ADAL" clId="{B0F65F1A-47D9-0541-A4E5-BE40BC898954}" dt="2025-05-23T03:31:00.231" v="82"/>
+            <ac:spMkLst>
+              <pc:docMk/>
+              <pc:sldMasterMk cId="806875768" sldId="2147483660"/>
+              <pc:sldLayoutMk cId="1977739395" sldId="2147483664"/>
+              <ac:spMk id="4" creationId="{00000000-0000-0000-0000-000000000000}"/>
+            </ac:spMkLst>
+          </pc:spChg>
+        </pc:sldLayoutChg>
+        <pc:sldLayoutChg chg="modSp">
+          <pc:chgData name="Barkasi, Michael" userId="604489e9-c8b5-4a18-ae0d-3a3e29c44efc" providerId="ADAL" clId="{B0F65F1A-47D9-0541-A4E5-BE40BC898954}" dt="2025-05-23T03:31:00.231" v="82"/>
+          <pc:sldLayoutMkLst>
+            <pc:docMk/>
+            <pc:sldMasterMk cId="806875768" sldId="2147483660"/>
+            <pc:sldLayoutMk cId="1634128904" sldId="2147483665"/>
+          </pc:sldLayoutMkLst>
+          <pc:spChg chg="mod">
+            <ac:chgData name="Barkasi, Michael" userId="604489e9-c8b5-4a18-ae0d-3a3e29c44efc" providerId="ADAL" clId="{B0F65F1A-47D9-0541-A4E5-BE40BC898954}" dt="2025-05-23T03:31:00.231" v="82"/>
+            <ac:spMkLst>
+              <pc:docMk/>
+              <pc:sldMasterMk cId="806875768" sldId="2147483660"/>
+              <pc:sldLayoutMk cId="1634128904" sldId="2147483665"/>
+              <ac:spMk id="2" creationId="{00000000-0000-0000-0000-000000000000}"/>
+            </ac:spMkLst>
+          </pc:spChg>
+          <pc:spChg chg="mod">
+            <ac:chgData name="Barkasi, Michael" userId="604489e9-c8b5-4a18-ae0d-3a3e29c44efc" providerId="ADAL" clId="{B0F65F1A-47D9-0541-A4E5-BE40BC898954}" dt="2025-05-23T03:31:00.231" v="82"/>
+            <ac:spMkLst>
+              <pc:docMk/>
+              <pc:sldMasterMk cId="806875768" sldId="2147483660"/>
+              <pc:sldLayoutMk cId="1634128904" sldId="2147483665"/>
+              <ac:spMk id="3" creationId="{00000000-0000-0000-0000-000000000000}"/>
+            </ac:spMkLst>
+          </pc:spChg>
+          <pc:spChg chg="mod">
+            <ac:chgData name="Barkasi, Michael" userId="604489e9-c8b5-4a18-ae0d-3a3e29c44efc" providerId="ADAL" clId="{B0F65F1A-47D9-0541-A4E5-BE40BC898954}" dt="2025-05-23T03:31:00.231" v="82"/>
+            <ac:spMkLst>
+              <pc:docMk/>
+              <pc:sldMasterMk cId="806875768" sldId="2147483660"/>
+              <pc:sldLayoutMk cId="1634128904" sldId="2147483665"/>
+              <ac:spMk id="4" creationId="{00000000-0000-0000-0000-000000000000}"/>
+            </ac:spMkLst>
+          </pc:spChg>
+          <pc:spChg chg="mod">
+            <ac:chgData name="Barkasi, Michael" userId="604489e9-c8b5-4a18-ae0d-3a3e29c44efc" providerId="ADAL" clId="{B0F65F1A-47D9-0541-A4E5-BE40BC898954}" dt="2025-05-23T03:31:00.231" v="82"/>
+            <ac:spMkLst>
+              <pc:docMk/>
+              <pc:sldMasterMk cId="806875768" sldId="2147483660"/>
+              <pc:sldLayoutMk cId="1634128904" sldId="2147483665"/>
+              <ac:spMk id="5" creationId="{00000000-0000-0000-0000-000000000000}"/>
+            </ac:spMkLst>
+          </pc:spChg>
+          <pc:spChg chg="mod">
+            <ac:chgData name="Barkasi, Michael" userId="604489e9-c8b5-4a18-ae0d-3a3e29c44efc" providerId="ADAL" clId="{B0F65F1A-47D9-0541-A4E5-BE40BC898954}" dt="2025-05-23T03:31:00.231" v="82"/>
+            <ac:spMkLst>
+              <pc:docMk/>
+              <pc:sldMasterMk cId="806875768" sldId="2147483660"/>
+              <pc:sldLayoutMk cId="1634128904" sldId="2147483665"/>
+              <ac:spMk id="6" creationId="{00000000-0000-0000-0000-000000000000}"/>
+            </ac:spMkLst>
+          </pc:spChg>
+        </pc:sldLayoutChg>
+        <pc:sldLayoutChg chg="modSp">
+          <pc:chgData name="Barkasi, Michael" userId="604489e9-c8b5-4a18-ae0d-3a3e29c44efc" providerId="ADAL" clId="{B0F65F1A-47D9-0541-A4E5-BE40BC898954}" dt="2025-05-23T03:31:00.231" v="82"/>
+          <pc:sldLayoutMkLst>
+            <pc:docMk/>
+            <pc:sldMasterMk cId="806875768" sldId="2147483660"/>
+            <pc:sldLayoutMk cId="104288853" sldId="2147483668"/>
+          </pc:sldLayoutMkLst>
+          <pc:spChg chg="mod">
+            <ac:chgData name="Barkasi, Michael" userId="604489e9-c8b5-4a18-ae0d-3a3e29c44efc" providerId="ADAL" clId="{B0F65F1A-47D9-0541-A4E5-BE40BC898954}" dt="2025-05-23T03:31:00.231" v="82"/>
+            <ac:spMkLst>
+              <pc:docMk/>
+              <pc:sldMasterMk cId="806875768" sldId="2147483660"/>
+              <pc:sldLayoutMk cId="104288853" sldId="2147483668"/>
+              <ac:spMk id="2" creationId="{00000000-0000-0000-0000-000000000000}"/>
+            </ac:spMkLst>
+          </pc:spChg>
+          <pc:spChg chg="mod">
+            <ac:chgData name="Barkasi, Michael" userId="604489e9-c8b5-4a18-ae0d-3a3e29c44efc" providerId="ADAL" clId="{B0F65F1A-47D9-0541-A4E5-BE40BC898954}" dt="2025-05-23T03:31:00.231" v="82"/>
+            <ac:spMkLst>
+              <pc:docMk/>
+              <pc:sldMasterMk cId="806875768" sldId="2147483660"/>
+              <pc:sldLayoutMk cId="104288853" sldId="2147483668"/>
+              <ac:spMk id="3" creationId="{00000000-0000-0000-0000-000000000000}"/>
+            </ac:spMkLst>
+          </pc:spChg>
+          <pc:spChg chg="mod">
+            <ac:chgData name="Barkasi, Michael" userId="604489e9-c8b5-4a18-ae0d-3a3e29c44efc" providerId="ADAL" clId="{B0F65F1A-47D9-0541-A4E5-BE40BC898954}" dt="2025-05-23T03:31:00.231" v="82"/>
+            <ac:spMkLst>
+              <pc:docMk/>
+              <pc:sldMasterMk cId="806875768" sldId="2147483660"/>
+              <pc:sldLayoutMk cId="104288853" sldId="2147483668"/>
+              <ac:spMk id="4" creationId="{00000000-0000-0000-0000-000000000000}"/>
+            </ac:spMkLst>
+          </pc:spChg>
+        </pc:sldLayoutChg>
+        <pc:sldLayoutChg chg="modSp">
+          <pc:chgData name="Barkasi, Michael" userId="604489e9-c8b5-4a18-ae0d-3a3e29c44efc" providerId="ADAL" clId="{B0F65F1A-47D9-0541-A4E5-BE40BC898954}" dt="2025-05-23T03:31:00.231" v="82"/>
+          <pc:sldLayoutMkLst>
+            <pc:docMk/>
+            <pc:sldMasterMk cId="806875768" sldId="2147483660"/>
+            <pc:sldLayoutMk cId="1096110911" sldId="2147483669"/>
+          </pc:sldLayoutMkLst>
+          <pc:spChg chg="mod">
+            <ac:chgData name="Barkasi, Michael" userId="604489e9-c8b5-4a18-ae0d-3a3e29c44efc" providerId="ADAL" clId="{B0F65F1A-47D9-0541-A4E5-BE40BC898954}" dt="2025-05-23T03:31:00.231" v="82"/>
+            <ac:spMkLst>
+              <pc:docMk/>
+              <pc:sldMasterMk cId="806875768" sldId="2147483660"/>
+              <pc:sldLayoutMk cId="1096110911" sldId="2147483669"/>
+              <ac:spMk id="2" creationId="{00000000-0000-0000-0000-000000000000}"/>
+            </ac:spMkLst>
+          </pc:spChg>
+          <pc:spChg chg="mod">
+            <ac:chgData name="Barkasi, Michael" userId="604489e9-c8b5-4a18-ae0d-3a3e29c44efc" providerId="ADAL" clId="{B0F65F1A-47D9-0541-A4E5-BE40BC898954}" dt="2025-05-23T03:31:00.231" v="82"/>
+            <ac:spMkLst>
+              <pc:docMk/>
+              <pc:sldMasterMk cId="806875768" sldId="2147483660"/>
+              <pc:sldLayoutMk cId="1096110911" sldId="2147483669"/>
+              <ac:spMk id="3" creationId="{00000000-0000-0000-0000-000000000000}"/>
+            </ac:spMkLst>
+          </pc:spChg>
+          <pc:spChg chg="mod">
+            <ac:chgData name="Barkasi, Michael" userId="604489e9-c8b5-4a18-ae0d-3a3e29c44efc" providerId="ADAL" clId="{B0F65F1A-47D9-0541-A4E5-BE40BC898954}" dt="2025-05-23T03:31:00.231" v="82"/>
+            <ac:spMkLst>
+              <pc:docMk/>
+              <pc:sldMasterMk cId="806875768" sldId="2147483660"/>
+              <pc:sldLayoutMk cId="1096110911" sldId="2147483669"/>
+              <ac:spMk id="4" creationId="{00000000-0000-0000-0000-000000000000}"/>
+            </ac:spMkLst>
+          </pc:spChg>
+        </pc:sldLayoutChg>
+        <pc:sldLayoutChg chg="modSp">
+          <pc:chgData name="Barkasi, Michael" userId="604489e9-c8b5-4a18-ae0d-3a3e29c44efc" providerId="ADAL" clId="{B0F65F1A-47D9-0541-A4E5-BE40BC898954}" dt="2025-05-23T03:31:00.231" v="82"/>
+          <pc:sldLayoutMkLst>
+            <pc:docMk/>
+            <pc:sldMasterMk cId="806875768" sldId="2147483660"/>
+            <pc:sldLayoutMk cId="2907170065" sldId="2147483671"/>
+          </pc:sldLayoutMkLst>
+          <pc:spChg chg="mod">
+            <ac:chgData name="Barkasi, Michael" userId="604489e9-c8b5-4a18-ae0d-3a3e29c44efc" providerId="ADAL" clId="{B0F65F1A-47D9-0541-A4E5-BE40BC898954}" dt="2025-05-23T03:31:00.231" v="82"/>
+            <ac:spMkLst>
+              <pc:docMk/>
+              <pc:sldMasterMk cId="806875768" sldId="2147483660"/>
+              <pc:sldLayoutMk cId="2907170065" sldId="2147483671"/>
+              <ac:spMk id="2" creationId="{00000000-0000-0000-0000-000000000000}"/>
+            </ac:spMkLst>
+          </pc:spChg>
+          <pc:spChg chg="mod">
+            <ac:chgData name="Barkasi, Michael" userId="604489e9-c8b5-4a18-ae0d-3a3e29c44efc" providerId="ADAL" clId="{B0F65F1A-47D9-0541-A4E5-BE40BC898954}" dt="2025-05-23T03:31:00.231" v="82"/>
+            <ac:spMkLst>
+              <pc:docMk/>
+              <pc:sldMasterMk cId="806875768" sldId="2147483660"/>
+              <pc:sldLayoutMk cId="2907170065" sldId="2147483671"/>
+              <ac:spMk id="3" creationId="{00000000-0000-0000-0000-000000000000}"/>
+            </ac:spMkLst>
+          </pc:spChg>
+        </pc:sldLayoutChg>
+      </pc:sldMasterChg>
     </pc:docChg>
   </pc:docChgLst>
 </pc:chgInfo>
@@ -267,15 +708,15 @@
         </p:nvSpPr>
         <p:spPr>
           <a:xfrm>
-            <a:off x="2171700" y="1795781"/>
-            <a:ext cx="13030200" cy="3820160"/>
+            <a:off x="1303020" y="1870605"/>
+            <a:ext cx="14767560" cy="3979333"/>
           </a:xfrm>
         </p:spPr>
         <p:txBody>
           <a:bodyPr anchor="b"/>
           <a:lstStyle>
             <a:lvl1pPr algn="ctr">
-              <a:defRPr sz="8550"/>
+              <a:defRPr sz="10000"/>
             </a:lvl1pPr>
           </a:lstStyle>
           <a:p>
@@ -299,8 +740,8 @@
         </p:nvSpPr>
         <p:spPr>
           <a:xfrm>
-            <a:off x="2171700" y="5763261"/>
-            <a:ext cx="13030200" cy="2649219"/>
+            <a:off x="2171700" y="6003397"/>
+            <a:ext cx="13030200" cy="2759603"/>
           </a:xfrm>
         </p:spPr>
         <p:txBody>
@@ -308,39 +749,39 @@
           <a:lstStyle>
             <a:lvl1pPr marL="0" indent="0" algn="ctr">
               <a:buNone/>
-              <a:defRPr sz="3420"/>
+              <a:defRPr sz="4000"/>
             </a:lvl1pPr>
-            <a:lvl2pPr marL="651510" indent="0" algn="ctr">
-              <a:buNone/>
-              <a:defRPr sz="2850"/>
+            <a:lvl2pPr marL="762015" indent="0" algn="ctr">
+              <a:buNone/>
+              <a:defRPr sz="3333"/>
             </a:lvl2pPr>
-            <a:lvl3pPr marL="1303020" indent="0" algn="ctr">
-              <a:buNone/>
-              <a:defRPr sz="2565"/>
+            <a:lvl3pPr marL="1524030" indent="0" algn="ctr">
+              <a:buNone/>
+              <a:defRPr sz="3000"/>
             </a:lvl3pPr>
-            <a:lvl4pPr marL="1954530" indent="0" algn="ctr">
-              <a:buNone/>
-              <a:defRPr sz="2280"/>
+            <a:lvl4pPr marL="2286046" indent="0" algn="ctr">
+              <a:buNone/>
+              <a:defRPr sz="2667"/>
             </a:lvl4pPr>
-            <a:lvl5pPr marL="2606040" indent="0" algn="ctr">
-              <a:buNone/>
-              <a:defRPr sz="2280"/>
+            <a:lvl5pPr marL="3048061" indent="0" algn="ctr">
+              <a:buNone/>
+              <a:defRPr sz="2667"/>
             </a:lvl5pPr>
-            <a:lvl6pPr marL="3257550" indent="0" algn="ctr">
-              <a:buNone/>
-              <a:defRPr sz="2280"/>
+            <a:lvl6pPr marL="3810076" indent="0" algn="ctr">
+              <a:buNone/>
+              <a:defRPr sz="2667"/>
             </a:lvl6pPr>
-            <a:lvl7pPr marL="3909060" indent="0" algn="ctr">
-              <a:buNone/>
-              <a:defRPr sz="2280"/>
+            <a:lvl7pPr marL="4572091" indent="0" algn="ctr">
+              <a:buNone/>
+              <a:defRPr sz="2667"/>
             </a:lvl7pPr>
-            <a:lvl8pPr marL="4560570" indent="0" algn="ctr">
-              <a:buNone/>
-              <a:defRPr sz="2280"/>
+            <a:lvl8pPr marL="5334107" indent="0" algn="ctr">
+              <a:buNone/>
+              <a:defRPr sz="2667"/>
             </a:lvl8pPr>
-            <a:lvl9pPr marL="5212080" indent="0" algn="ctr">
-              <a:buNone/>
-              <a:defRPr sz="2280"/>
+            <a:lvl9pPr marL="6096122" indent="0" algn="ctr">
+              <a:buNone/>
+              <a:defRPr sz="2667"/>
             </a:lvl9pPr>
           </a:lstStyle>
           <a:p>
@@ -369,7 +810,7 @@
           <a:p>
             <a:fld id="{A66A2E94-B547-E748-9FAE-0669CBE3935E}" type="datetimeFigureOut">
               <a:rPr lang="en-US" smtClean="0"/>
-              <a:t>5/9/25</a:t>
+              <a:t>5/22/25</a:t>
             </a:fld>
             <a:endParaRPr lang="en-US"/>
           </a:p>
@@ -420,7 +861,7 @@
     </p:spTree>
     <p:extLst>
       <p:ext uri="{BB962C8B-B14F-4D97-AF65-F5344CB8AC3E}">
-        <p14:creationId xmlns:p14="http://schemas.microsoft.com/office/powerpoint/2010/main" val="384000379"/>
+        <p14:creationId xmlns:p14="http://schemas.microsoft.com/office/powerpoint/2010/main" val="3534606914"/>
       </p:ext>
     </p:extLst>
   </p:cSld>
@@ -539,7 +980,7 @@
           <a:p>
             <a:fld id="{A66A2E94-B547-E748-9FAE-0669CBE3935E}" type="datetimeFigureOut">
               <a:rPr lang="en-US" smtClean="0"/>
-              <a:t>5/9/25</a:t>
+              <a:t>5/22/25</a:t>
             </a:fld>
             <a:endParaRPr lang="en-US"/>
           </a:p>
@@ -590,7 +1031,7 @@
     </p:spTree>
     <p:extLst>
       <p:ext uri="{BB962C8B-B14F-4D97-AF65-F5344CB8AC3E}">
-        <p14:creationId xmlns:p14="http://schemas.microsoft.com/office/powerpoint/2010/main" val="3255661058"/>
+        <p14:creationId xmlns:p14="http://schemas.microsoft.com/office/powerpoint/2010/main" val="4158537884"/>
       </p:ext>
     </p:extLst>
   </p:cSld>
@@ -629,8 +1070,8 @@
         </p:nvSpPr>
         <p:spPr>
           <a:xfrm>
-            <a:off x="12432982" y="584200"/>
-            <a:ext cx="3746183" cy="9298941"/>
+            <a:off x="12432983" y="608541"/>
+            <a:ext cx="3746183" cy="9686397"/>
           </a:xfrm>
         </p:spPr>
         <p:txBody>
@@ -657,8 +1098,8 @@
         </p:nvSpPr>
         <p:spPr>
           <a:xfrm>
-            <a:off x="1194435" y="584200"/>
-            <a:ext cx="11021378" cy="9298941"/>
+            <a:off x="1194436" y="608541"/>
+            <a:ext cx="11021378" cy="9686397"/>
           </a:xfrm>
         </p:spPr>
         <p:txBody>
@@ -719,7 +1160,7 @@
           <a:p>
             <a:fld id="{A66A2E94-B547-E748-9FAE-0669CBE3935E}" type="datetimeFigureOut">
               <a:rPr lang="en-US" smtClean="0"/>
-              <a:t>5/9/25</a:t>
+              <a:t>5/22/25</a:t>
             </a:fld>
             <a:endParaRPr lang="en-US"/>
           </a:p>
@@ -770,7 +1211,7 @@
     </p:spTree>
     <p:extLst>
       <p:ext uri="{BB962C8B-B14F-4D97-AF65-F5344CB8AC3E}">
-        <p14:creationId xmlns:p14="http://schemas.microsoft.com/office/powerpoint/2010/main" val="2907170065"/>
+        <p14:creationId xmlns:p14="http://schemas.microsoft.com/office/powerpoint/2010/main" val="2262182530"/>
       </p:ext>
     </p:extLst>
   </p:cSld>
@@ -889,7 +1330,7 @@
           <a:p>
             <a:fld id="{A66A2E94-B547-E748-9FAE-0669CBE3935E}" type="datetimeFigureOut">
               <a:rPr lang="en-US" smtClean="0"/>
-              <a:t>5/9/25</a:t>
+              <a:t>5/22/25</a:t>
             </a:fld>
             <a:endParaRPr lang="en-US"/>
           </a:p>
@@ -940,7 +1381,7 @@
     </p:spTree>
     <p:extLst>
       <p:ext uri="{BB962C8B-B14F-4D97-AF65-F5344CB8AC3E}">
-        <p14:creationId xmlns:p14="http://schemas.microsoft.com/office/powerpoint/2010/main" val="2089762303"/>
+        <p14:creationId xmlns:p14="http://schemas.microsoft.com/office/powerpoint/2010/main" val="1607775153"/>
       </p:ext>
     </p:extLst>
   </p:cSld>
@@ -979,15 +1420,15 @@
         </p:nvSpPr>
         <p:spPr>
           <a:xfrm>
-            <a:off x="1185386" y="2735582"/>
-            <a:ext cx="14984730" cy="4564379"/>
+            <a:off x="1185387" y="2849566"/>
+            <a:ext cx="14984730" cy="4754562"/>
           </a:xfrm>
         </p:spPr>
         <p:txBody>
           <a:bodyPr anchor="b"/>
           <a:lstStyle>
             <a:lvl1pPr>
-              <a:defRPr sz="8550"/>
+              <a:defRPr sz="10000"/>
             </a:lvl1pPr>
           </a:lstStyle>
           <a:p>
@@ -1011,8 +1452,8 @@
         </p:nvSpPr>
         <p:spPr>
           <a:xfrm>
-            <a:off x="1185386" y="7343142"/>
-            <a:ext cx="14984730" cy="2400299"/>
+            <a:off x="1185387" y="7649107"/>
+            <a:ext cx="14984730" cy="2500312"/>
           </a:xfrm>
         </p:spPr>
         <p:txBody>
@@ -1020,7 +1461,7 @@
           <a:lstStyle>
             <a:lvl1pPr marL="0" indent="0">
               <a:buNone/>
-              <a:defRPr sz="3420">
+              <a:defRPr sz="4000">
                 <a:solidFill>
                   <a:schemeClr val="tx1">
                     <a:tint val="82000"/>
@@ -1028,9 +1469,9 @@
                 </a:solidFill>
               </a:defRPr>
             </a:lvl1pPr>
-            <a:lvl2pPr marL="651510" indent="0">
-              <a:buNone/>
-              <a:defRPr sz="2850">
+            <a:lvl2pPr marL="762015" indent="0">
+              <a:buNone/>
+              <a:defRPr sz="3333">
                 <a:solidFill>
                   <a:schemeClr val="tx1">
                     <a:tint val="82000"/>
@@ -1038,9 +1479,9 @@
                 </a:solidFill>
               </a:defRPr>
             </a:lvl2pPr>
-            <a:lvl3pPr marL="1303020" indent="0">
-              <a:buNone/>
-              <a:defRPr sz="2565">
+            <a:lvl3pPr marL="1524030" indent="0">
+              <a:buNone/>
+              <a:defRPr sz="3000">
                 <a:solidFill>
                   <a:schemeClr val="tx1">
                     <a:tint val="82000"/>
@@ -1048,9 +1489,9 @@
                 </a:solidFill>
               </a:defRPr>
             </a:lvl3pPr>
-            <a:lvl4pPr marL="1954530" indent="0">
-              <a:buNone/>
-              <a:defRPr sz="2280">
+            <a:lvl4pPr marL="2286046" indent="0">
+              <a:buNone/>
+              <a:defRPr sz="2667">
                 <a:solidFill>
                   <a:schemeClr val="tx1">
                     <a:tint val="82000"/>
@@ -1058,9 +1499,9 @@
                 </a:solidFill>
               </a:defRPr>
             </a:lvl4pPr>
-            <a:lvl5pPr marL="2606040" indent="0">
-              <a:buNone/>
-              <a:defRPr sz="2280">
+            <a:lvl5pPr marL="3048061" indent="0">
+              <a:buNone/>
+              <a:defRPr sz="2667">
                 <a:solidFill>
                   <a:schemeClr val="tx1">
                     <a:tint val="82000"/>
@@ -1068,9 +1509,9 @@
                 </a:solidFill>
               </a:defRPr>
             </a:lvl5pPr>
-            <a:lvl6pPr marL="3257550" indent="0">
-              <a:buNone/>
-              <a:defRPr sz="2280">
+            <a:lvl6pPr marL="3810076" indent="0">
+              <a:buNone/>
+              <a:defRPr sz="2667">
                 <a:solidFill>
                   <a:schemeClr val="tx1">
                     <a:tint val="82000"/>
@@ -1078,9 +1519,9 @@
                 </a:solidFill>
               </a:defRPr>
             </a:lvl6pPr>
-            <a:lvl7pPr marL="3909060" indent="0">
-              <a:buNone/>
-              <a:defRPr sz="2280">
+            <a:lvl7pPr marL="4572091" indent="0">
+              <a:buNone/>
+              <a:defRPr sz="2667">
                 <a:solidFill>
                   <a:schemeClr val="tx1">
                     <a:tint val="82000"/>
@@ -1088,9 +1529,9 @@
                 </a:solidFill>
               </a:defRPr>
             </a:lvl7pPr>
-            <a:lvl8pPr marL="4560570" indent="0">
-              <a:buNone/>
-              <a:defRPr sz="2280">
+            <a:lvl8pPr marL="5334107" indent="0">
+              <a:buNone/>
+              <a:defRPr sz="2667">
                 <a:solidFill>
                   <a:schemeClr val="tx1">
                     <a:tint val="82000"/>
@@ -1098,9 +1539,9 @@
                 </a:solidFill>
               </a:defRPr>
             </a:lvl8pPr>
-            <a:lvl9pPr marL="5212080" indent="0">
-              <a:buNone/>
-              <a:defRPr sz="2280">
+            <a:lvl9pPr marL="6096122" indent="0">
+              <a:buNone/>
+              <a:defRPr sz="2667">
                 <a:solidFill>
                   <a:schemeClr val="tx1">
                     <a:tint val="82000"/>
@@ -1135,7 +1576,7 @@
           <a:p>
             <a:fld id="{A66A2E94-B547-E748-9FAE-0669CBE3935E}" type="datetimeFigureOut">
               <a:rPr lang="en-US" smtClean="0"/>
-              <a:t>5/9/25</a:t>
+              <a:t>5/22/25</a:t>
             </a:fld>
             <a:endParaRPr lang="en-US"/>
           </a:p>
@@ -1186,7 +1627,7 @@
     </p:spTree>
     <p:extLst>
       <p:ext uri="{BB962C8B-B14F-4D97-AF65-F5344CB8AC3E}">
-        <p14:creationId xmlns:p14="http://schemas.microsoft.com/office/powerpoint/2010/main" val="3532096364"/>
+        <p14:creationId xmlns:p14="http://schemas.microsoft.com/office/powerpoint/2010/main" val="1814710189"/>
       </p:ext>
     </p:extLst>
   </p:cSld>
@@ -1248,8 +1689,8 @@
         </p:nvSpPr>
         <p:spPr>
           <a:xfrm>
-            <a:off x="1194435" y="2921000"/>
-            <a:ext cx="7383780" cy="6962141"/>
+            <a:off x="1194435" y="3042708"/>
+            <a:ext cx="7383780" cy="7252230"/>
           </a:xfrm>
         </p:spPr>
         <p:txBody>
@@ -1305,8 +1746,8 @@
         </p:nvSpPr>
         <p:spPr>
           <a:xfrm>
-            <a:off x="8795385" y="2921000"/>
-            <a:ext cx="7383780" cy="6962141"/>
+            <a:off x="8795385" y="3042708"/>
+            <a:ext cx="7383780" cy="7252230"/>
           </a:xfrm>
         </p:spPr>
         <p:txBody>
@@ -1367,7 +1808,7 @@
           <a:p>
             <a:fld id="{A66A2E94-B547-E748-9FAE-0669CBE3935E}" type="datetimeFigureOut">
               <a:rPr lang="en-US" smtClean="0"/>
-              <a:t>5/9/25</a:t>
+              <a:t>5/22/25</a:t>
             </a:fld>
             <a:endParaRPr lang="en-US"/>
           </a:p>
@@ -1418,7 +1859,7 @@
     </p:spTree>
     <p:extLst>
       <p:ext uri="{BB962C8B-B14F-4D97-AF65-F5344CB8AC3E}">
-        <p14:creationId xmlns:p14="http://schemas.microsoft.com/office/powerpoint/2010/main" val="1977739395"/>
+        <p14:creationId xmlns:p14="http://schemas.microsoft.com/office/powerpoint/2010/main" val="3506701536"/>
       </p:ext>
     </p:extLst>
   </p:cSld>
@@ -1457,8 +1898,8 @@
         </p:nvSpPr>
         <p:spPr>
           <a:xfrm>
-            <a:off x="1196698" y="584201"/>
-            <a:ext cx="14984730" cy="2120901"/>
+            <a:off x="1196698" y="608544"/>
+            <a:ext cx="14984730" cy="2209272"/>
           </a:xfrm>
         </p:spPr>
         <p:txBody>
@@ -1485,8 +1926,8 @@
         </p:nvSpPr>
         <p:spPr>
           <a:xfrm>
-            <a:off x="1196699" y="2689861"/>
-            <a:ext cx="7349846" cy="1318259"/>
+            <a:off x="1196700" y="2801938"/>
+            <a:ext cx="7349846" cy="1373187"/>
           </a:xfrm>
         </p:spPr>
         <p:txBody>
@@ -1494,39 +1935,39 @@
           <a:lstStyle>
             <a:lvl1pPr marL="0" indent="0">
               <a:buNone/>
-              <a:defRPr sz="3420" b="1"/>
+              <a:defRPr sz="4000" b="1"/>
             </a:lvl1pPr>
-            <a:lvl2pPr marL="651510" indent="0">
-              <a:buNone/>
-              <a:defRPr sz="2850" b="1"/>
+            <a:lvl2pPr marL="762015" indent="0">
+              <a:buNone/>
+              <a:defRPr sz="3333" b="1"/>
             </a:lvl2pPr>
-            <a:lvl3pPr marL="1303020" indent="0">
-              <a:buNone/>
-              <a:defRPr sz="2565" b="1"/>
+            <a:lvl3pPr marL="1524030" indent="0">
+              <a:buNone/>
+              <a:defRPr sz="3000" b="1"/>
             </a:lvl3pPr>
-            <a:lvl4pPr marL="1954530" indent="0">
-              <a:buNone/>
-              <a:defRPr sz="2280" b="1"/>
+            <a:lvl4pPr marL="2286046" indent="0">
+              <a:buNone/>
+              <a:defRPr sz="2667" b="1"/>
             </a:lvl4pPr>
-            <a:lvl5pPr marL="2606040" indent="0">
-              <a:buNone/>
-              <a:defRPr sz="2280" b="1"/>
+            <a:lvl5pPr marL="3048061" indent="0">
+              <a:buNone/>
+              <a:defRPr sz="2667" b="1"/>
             </a:lvl5pPr>
-            <a:lvl6pPr marL="3257550" indent="0">
-              <a:buNone/>
-              <a:defRPr sz="2280" b="1"/>
+            <a:lvl6pPr marL="3810076" indent="0">
+              <a:buNone/>
+              <a:defRPr sz="2667" b="1"/>
             </a:lvl6pPr>
-            <a:lvl7pPr marL="3909060" indent="0">
-              <a:buNone/>
-              <a:defRPr sz="2280" b="1"/>
+            <a:lvl7pPr marL="4572091" indent="0">
+              <a:buNone/>
+              <a:defRPr sz="2667" b="1"/>
             </a:lvl7pPr>
-            <a:lvl8pPr marL="4560570" indent="0">
-              <a:buNone/>
-              <a:defRPr sz="2280" b="1"/>
+            <a:lvl8pPr marL="5334107" indent="0">
+              <a:buNone/>
+              <a:defRPr sz="2667" b="1"/>
             </a:lvl8pPr>
-            <a:lvl9pPr marL="5212080" indent="0">
-              <a:buNone/>
-              <a:defRPr sz="2280" b="1"/>
+            <a:lvl9pPr marL="6096122" indent="0">
+              <a:buNone/>
+              <a:defRPr sz="2667" b="1"/>
             </a:lvl9pPr>
           </a:lstStyle>
           <a:p>
@@ -1550,8 +1991,8 @@
         </p:nvSpPr>
         <p:spPr>
           <a:xfrm>
-            <a:off x="1196699" y="4008120"/>
-            <a:ext cx="7349846" cy="5895341"/>
+            <a:off x="1196700" y="4175125"/>
+            <a:ext cx="7349846" cy="6140980"/>
           </a:xfrm>
         </p:spPr>
         <p:txBody>
@@ -1607,8 +2048,8 @@
         </p:nvSpPr>
         <p:spPr>
           <a:xfrm>
-            <a:off x="8795385" y="2689861"/>
-            <a:ext cx="7386043" cy="1318259"/>
+            <a:off x="8795386" y="2801938"/>
+            <a:ext cx="7386043" cy="1373187"/>
           </a:xfrm>
         </p:spPr>
         <p:txBody>
@@ -1616,39 +2057,39 @@
           <a:lstStyle>
             <a:lvl1pPr marL="0" indent="0">
               <a:buNone/>
-              <a:defRPr sz="3420" b="1"/>
+              <a:defRPr sz="4000" b="1"/>
             </a:lvl1pPr>
-            <a:lvl2pPr marL="651510" indent="0">
-              <a:buNone/>
-              <a:defRPr sz="2850" b="1"/>
+            <a:lvl2pPr marL="762015" indent="0">
+              <a:buNone/>
+              <a:defRPr sz="3333" b="1"/>
             </a:lvl2pPr>
-            <a:lvl3pPr marL="1303020" indent="0">
-              <a:buNone/>
-              <a:defRPr sz="2565" b="1"/>
+            <a:lvl3pPr marL="1524030" indent="0">
+              <a:buNone/>
+              <a:defRPr sz="3000" b="1"/>
             </a:lvl3pPr>
-            <a:lvl4pPr marL="1954530" indent="0">
-              <a:buNone/>
-              <a:defRPr sz="2280" b="1"/>
+            <a:lvl4pPr marL="2286046" indent="0">
+              <a:buNone/>
+              <a:defRPr sz="2667" b="1"/>
             </a:lvl4pPr>
-            <a:lvl5pPr marL="2606040" indent="0">
-              <a:buNone/>
-              <a:defRPr sz="2280" b="1"/>
+            <a:lvl5pPr marL="3048061" indent="0">
+              <a:buNone/>
+              <a:defRPr sz="2667" b="1"/>
             </a:lvl5pPr>
-            <a:lvl6pPr marL="3257550" indent="0">
-              <a:buNone/>
-              <a:defRPr sz="2280" b="1"/>
+            <a:lvl6pPr marL="3810076" indent="0">
+              <a:buNone/>
+              <a:defRPr sz="2667" b="1"/>
             </a:lvl6pPr>
-            <a:lvl7pPr marL="3909060" indent="0">
-              <a:buNone/>
-              <a:defRPr sz="2280" b="1"/>
+            <a:lvl7pPr marL="4572091" indent="0">
+              <a:buNone/>
+              <a:defRPr sz="2667" b="1"/>
             </a:lvl7pPr>
-            <a:lvl8pPr marL="4560570" indent="0">
-              <a:buNone/>
-              <a:defRPr sz="2280" b="1"/>
+            <a:lvl8pPr marL="5334107" indent="0">
+              <a:buNone/>
+              <a:defRPr sz="2667" b="1"/>
             </a:lvl8pPr>
-            <a:lvl9pPr marL="5212080" indent="0">
-              <a:buNone/>
-              <a:defRPr sz="2280" b="1"/>
+            <a:lvl9pPr marL="6096122" indent="0">
+              <a:buNone/>
+              <a:defRPr sz="2667" b="1"/>
             </a:lvl9pPr>
           </a:lstStyle>
           <a:p>
@@ -1672,8 +2113,8 @@
         </p:nvSpPr>
         <p:spPr>
           <a:xfrm>
-            <a:off x="8795385" y="4008120"/>
-            <a:ext cx="7386043" cy="5895341"/>
+            <a:off x="8795386" y="4175125"/>
+            <a:ext cx="7386043" cy="6140980"/>
           </a:xfrm>
         </p:spPr>
         <p:txBody>
@@ -1734,7 +2175,7 @@
           <a:p>
             <a:fld id="{A66A2E94-B547-E748-9FAE-0669CBE3935E}" type="datetimeFigureOut">
               <a:rPr lang="en-US" smtClean="0"/>
-              <a:t>5/9/25</a:t>
+              <a:t>5/22/25</a:t>
             </a:fld>
             <a:endParaRPr lang="en-US"/>
           </a:p>
@@ -1785,7 +2226,7 @@
     </p:spTree>
     <p:extLst>
       <p:ext uri="{BB962C8B-B14F-4D97-AF65-F5344CB8AC3E}">
-        <p14:creationId xmlns:p14="http://schemas.microsoft.com/office/powerpoint/2010/main" val="1634128904"/>
+        <p14:creationId xmlns:p14="http://schemas.microsoft.com/office/powerpoint/2010/main" val="1588099938"/>
       </p:ext>
     </p:extLst>
   </p:cSld>
@@ -1852,7 +2293,7 @@
           <a:p>
             <a:fld id="{A66A2E94-B547-E748-9FAE-0669CBE3935E}" type="datetimeFigureOut">
               <a:rPr lang="en-US" smtClean="0"/>
-              <a:t>5/9/25</a:t>
+              <a:t>5/22/25</a:t>
             </a:fld>
             <a:endParaRPr lang="en-US"/>
           </a:p>
@@ -1903,7 +2344,7 @@
     </p:spTree>
     <p:extLst>
       <p:ext uri="{BB962C8B-B14F-4D97-AF65-F5344CB8AC3E}">
-        <p14:creationId xmlns:p14="http://schemas.microsoft.com/office/powerpoint/2010/main" val="1232673695"/>
+        <p14:creationId xmlns:p14="http://schemas.microsoft.com/office/powerpoint/2010/main" val="498499969"/>
       </p:ext>
     </p:extLst>
   </p:cSld>
@@ -1947,7 +2388,7 @@
           <a:p>
             <a:fld id="{A66A2E94-B547-E748-9FAE-0669CBE3935E}" type="datetimeFigureOut">
               <a:rPr lang="en-US" smtClean="0"/>
-              <a:t>5/9/25</a:t>
+              <a:t>5/22/25</a:t>
             </a:fld>
             <a:endParaRPr lang="en-US"/>
           </a:p>
@@ -1998,7 +2439,7 @@
     </p:spTree>
     <p:extLst>
       <p:ext uri="{BB962C8B-B14F-4D97-AF65-F5344CB8AC3E}">
-        <p14:creationId xmlns:p14="http://schemas.microsoft.com/office/powerpoint/2010/main" val="3604703829"/>
+        <p14:creationId xmlns:p14="http://schemas.microsoft.com/office/powerpoint/2010/main" val="2426507271"/>
       </p:ext>
     </p:extLst>
   </p:cSld>
@@ -2037,15 +2478,15 @@
         </p:nvSpPr>
         <p:spPr>
           <a:xfrm>
-            <a:off x="1196698" y="731520"/>
-            <a:ext cx="5603438" cy="2560320"/>
+            <a:off x="1196698" y="762000"/>
+            <a:ext cx="5603438" cy="2667000"/>
           </a:xfrm>
         </p:spPr>
         <p:txBody>
           <a:bodyPr anchor="b"/>
           <a:lstStyle>
             <a:lvl1pPr>
-              <a:defRPr sz="4560"/>
+              <a:defRPr sz="5333"/>
             </a:lvl1pPr>
           </a:lstStyle>
           <a:p>
@@ -2069,39 +2510,39 @@
         </p:nvSpPr>
         <p:spPr>
           <a:xfrm>
-            <a:off x="7386043" y="1579881"/>
-            <a:ext cx="8795385" cy="7797800"/>
+            <a:off x="7386043" y="1645711"/>
+            <a:ext cx="8795385" cy="8122708"/>
           </a:xfrm>
         </p:spPr>
         <p:txBody>
           <a:bodyPr/>
           <a:lstStyle>
             <a:lvl1pPr>
-              <a:defRPr sz="4560"/>
+              <a:defRPr sz="5333"/>
             </a:lvl1pPr>
             <a:lvl2pPr>
-              <a:defRPr sz="3990"/>
+              <a:defRPr sz="4667"/>
             </a:lvl2pPr>
             <a:lvl3pPr>
-              <a:defRPr sz="3420"/>
+              <a:defRPr sz="4000"/>
             </a:lvl3pPr>
             <a:lvl4pPr>
-              <a:defRPr sz="2850"/>
+              <a:defRPr sz="3333"/>
             </a:lvl4pPr>
             <a:lvl5pPr>
-              <a:defRPr sz="2850"/>
+              <a:defRPr sz="3333"/>
             </a:lvl5pPr>
             <a:lvl6pPr>
-              <a:defRPr sz="2850"/>
+              <a:defRPr sz="3333"/>
             </a:lvl6pPr>
             <a:lvl7pPr>
-              <a:defRPr sz="2850"/>
+              <a:defRPr sz="3333"/>
             </a:lvl7pPr>
             <a:lvl8pPr>
-              <a:defRPr sz="2850"/>
+              <a:defRPr sz="3333"/>
             </a:lvl8pPr>
             <a:lvl9pPr>
-              <a:defRPr sz="2850"/>
+              <a:defRPr sz="3333"/>
             </a:lvl9pPr>
           </a:lstStyle>
           <a:p>
@@ -2154,8 +2595,8 @@
         </p:nvSpPr>
         <p:spPr>
           <a:xfrm>
-            <a:off x="1196698" y="3291840"/>
-            <a:ext cx="5603438" cy="6098541"/>
+            <a:off x="1196698" y="3429000"/>
+            <a:ext cx="5603438" cy="6352647"/>
           </a:xfrm>
         </p:spPr>
         <p:txBody>
@@ -2163,39 +2604,39 @@
           <a:lstStyle>
             <a:lvl1pPr marL="0" indent="0">
               <a:buNone/>
-              <a:defRPr sz="2280"/>
+              <a:defRPr sz="2667"/>
             </a:lvl1pPr>
-            <a:lvl2pPr marL="651510" indent="0">
-              <a:buNone/>
-              <a:defRPr sz="1995"/>
+            <a:lvl2pPr marL="762015" indent="0">
+              <a:buNone/>
+              <a:defRPr sz="2333"/>
             </a:lvl2pPr>
-            <a:lvl3pPr marL="1303020" indent="0">
-              <a:buNone/>
-              <a:defRPr sz="1710"/>
+            <a:lvl3pPr marL="1524030" indent="0">
+              <a:buNone/>
+              <a:defRPr sz="2000"/>
             </a:lvl3pPr>
-            <a:lvl4pPr marL="1954530" indent="0">
-              <a:buNone/>
-              <a:defRPr sz="1425"/>
+            <a:lvl4pPr marL="2286046" indent="0">
+              <a:buNone/>
+              <a:defRPr sz="1667"/>
             </a:lvl4pPr>
-            <a:lvl5pPr marL="2606040" indent="0">
-              <a:buNone/>
-              <a:defRPr sz="1425"/>
+            <a:lvl5pPr marL="3048061" indent="0">
+              <a:buNone/>
+              <a:defRPr sz="1667"/>
             </a:lvl5pPr>
-            <a:lvl6pPr marL="3257550" indent="0">
-              <a:buNone/>
-              <a:defRPr sz="1425"/>
+            <a:lvl6pPr marL="3810076" indent="0">
+              <a:buNone/>
+              <a:defRPr sz="1667"/>
             </a:lvl6pPr>
-            <a:lvl7pPr marL="3909060" indent="0">
-              <a:buNone/>
-              <a:defRPr sz="1425"/>
+            <a:lvl7pPr marL="4572091" indent="0">
+              <a:buNone/>
+              <a:defRPr sz="1667"/>
             </a:lvl7pPr>
-            <a:lvl8pPr marL="4560570" indent="0">
-              <a:buNone/>
-              <a:defRPr sz="1425"/>
+            <a:lvl8pPr marL="5334107" indent="0">
+              <a:buNone/>
+              <a:defRPr sz="1667"/>
             </a:lvl8pPr>
-            <a:lvl9pPr marL="5212080" indent="0">
-              <a:buNone/>
-              <a:defRPr sz="1425"/>
+            <a:lvl9pPr marL="6096122" indent="0">
+              <a:buNone/>
+              <a:defRPr sz="1667"/>
             </a:lvl9pPr>
           </a:lstStyle>
           <a:p>
@@ -2224,7 +2665,7 @@
           <a:p>
             <a:fld id="{A66A2E94-B547-E748-9FAE-0669CBE3935E}" type="datetimeFigureOut">
               <a:rPr lang="en-US" smtClean="0"/>
-              <a:t>5/9/25</a:t>
+              <a:t>5/22/25</a:t>
             </a:fld>
             <a:endParaRPr lang="en-US"/>
           </a:p>
@@ -2275,7 +2716,7 @@
     </p:spTree>
     <p:extLst>
       <p:ext uri="{BB962C8B-B14F-4D97-AF65-F5344CB8AC3E}">
-        <p14:creationId xmlns:p14="http://schemas.microsoft.com/office/powerpoint/2010/main" val="104288853"/>
+        <p14:creationId xmlns:p14="http://schemas.microsoft.com/office/powerpoint/2010/main" val="1455642912"/>
       </p:ext>
     </p:extLst>
   </p:cSld>
@@ -2314,15 +2755,15 @@
         </p:nvSpPr>
         <p:spPr>
           <a:xfrm>
-            <a:off x="1196698" y="731520"/>
-            <a:ext cx="5603438" cy="2560320"/>
+            <a:off x="1196698" y="762000"/>
+            <a:ext cx="5603438" cy="2667000"/>
           </a:xfrm>
         </p:spPr>
         <p:txBody>
           <a:bodyPr anchor="b"/>
           <a:lstStyle>
             <a:lvl1pPr>
-              <a:defRPr sz="4560"/>
+              <a:defRPr sz="5333"/>
             </a:lvl1pPr>
           </a:lstStyle>
           <a:p>
@@ -2346,8 +2787,8 @@
         </p:nvSpPr>
         <p:spPr>
           <a:xfrm>
-            <a:off x="7386043" y="1579881"/>
-            <a:ext cx="8795385" cy="7797800"/>
+            <a:off x="7386043" y="1645711"/>
+            <a:ext cx="8795385" cy="8122708"/>
           </a:xfrm>
         </p:spPr>
         <p:txBody>
@@ -2355,39 +2796,39 @@
           <a:lstStyle>
             <a:lvl1pPr marL="0" indent="0">
               <a:buNone/>
-              <a:defRPr sz="4560"/>
+              <a:defRPr sz="5333"/>
             </a:lvl1pPr>
-            <a:lvl2pPr marL="651510" indent="0">
-              <a:buNone/>
-              <a:defRPr sz="3990"/>
+            <a:lvl2pPr marL="762015" indent="0">
+              <a:buNone/>
+              <a:defRPr sz="4667"/>
             </a:lvl2pPr>
-            <a:lvl3pPr marL="1303020" indent="0">
-              <a:buNone/>
-              <a:defRPr sz="3420"/>
+            <a:lvl3pPr marL="1524030" indent="0">
+              <a:buNone/>
+              <a:defRPr sz="4000"/>
             </a:lvl3pPr>
-            <a:lvl4pPr marL="1954530" indent="0">
-              <a:buNone/>
-              <a:defRPr sz="2850"/>
+            <a:lvl4pPr marL="2286046" indent="0">
+              <a:buNone/>
+              <a:defRPr sz="3333"/>
             </a:lvl4pPr>
-            <a:lvl5pPr marL="2606040" indent="0">
-              <a:buNone/>
-              <a:defRPr sz="2850"/>
+            <a:lvl5pPr marL="3048061" indent="0">
+              <a:buNone/>
+              <a:defRPr sz="3333"/>
             </a:lvl5pPr>
-            <a:lvl6pPr marL="3257550" indent="0">
-              <a:buNone/>
-              <a:defRPr sz="2850"/>
+            <a:lvl6pPr marL="3810076" indent="0">
+              <a:buNone/>
+              <a:defRPr sz="3333"/>
             </a:lvl6pPr>
-            <a:lvl7pPr marL="3909060" indent="0">
-              <a:buNone/>
-              <a:defRPr sz="2850"/>
+            <a:lvl7pPr marL="4572091" indent="0">
+              <a:buNone/>
+              <a:defRPr sz="3333"/>
             </a:lvl7pPr>
-            <a:lvl8pPr marL="4560570" indent="0">
-              <a:buNone/>
-              <a:defRPr sz="2850"/>
+            <a:lvl8pPr marL="5334107" indent="0">
+              <a:buNone/>
+              <a:defRPr sz="3333"/>
             </a:lvl8pPr>
-            <a:lvl9pPr marL="5212080" indent="0">
-              <a:buNone/>
-              <a:defRPr sz="2850"/>
+            <a:lvl9pPr marL="6096122" indent="0">
+              <a:buNone/>
+              <a:defRPr sz="3333"/>
             </a:lvl9pPr>
           </a:lstStyle>
           <a:p>
@@ -2411,8 +2852,8 @@
         </p:nvSpPr>
         <p:spPr>
           <a:xfrm>
-            <a:off x="1196698" y="3291840"/>
-            <a:ext cx="5603438" cy="6098541"/>
+            <a:off x="1196698" y="3429000"/>
+            <a:ext cx="5603438" cy="6352647"/>
           </a:xfrm>
         </p:spPr>
         <p:txBody>
@@ -2420,39 +2861,39 @@
           <a:lstStyle>
             <a:lvl1pPr marL="0" indent="0">
               <a:buNone/>
-              <a:defRPr sz="2280"/>
+              <a:defRPr sz="2667"/>
             </a:lvl1pPr>
-            <a:lvl2pPr marL="651510" indent="0">
-              <a:buNone/>
-              <a:defRPr sz="1995"/>
+            <a:lvl2pPr marL="762015" indent="0">
+              <a:buNone/>
+              <a:defRPr sz="2333"/>
             </a:lvl2pPr>
-            <a:lvl3pPr marL="1303020" indent="0">
-              <a:buNone/>
-              <a:defRPr sz="1710"/>
+            <a:lvl3pPr marL="1524030" indent="0">
+              <a:buNone/>
+              <a:defRPr sz="2000"/>
             </a:lvl3pPr>
-            <a:lvl4pPr marL="1954530" indent="0">
-              <a:buNone/>
-              <a:defRPr sz="1425"/>
+            <a:lvl4pPr marL="2286046" indent="0">
+              <a:buNone/>
+              <a:defRPr sz="1667"/>
             </a:lvl4pPr>
-            <a:lvl5pPr marL="2606040" indent="0">
-              <a:buNone/>
-              <a:defRPr sz="1425"/>
+            <a:lvl5pPr marL="3048061" indent="0">
+              <a:buNone/>
+              <a:defRPr sz="1667"/>
             </a:lvl5pPr>
-            <a:lvl6pPr marL="3257550" indent="0">
-              <a:buNone/>
-              <a:defRPr sz="1425"/>
+            <a:lvl6pPr marL="3810076" indent="0">
+              <a:buNone/>
+              <a:defRPr sz="1667"/>
             </a:lvl6pPr>
-            <a:lvl7pPr marL="3909060" indent="0">
-              <a:buNone/>
-              <a:defRPr sz="1425"/>
+            <a:lvl7pPr marL="4572091" indent="0">
+              <a:buNone/>
+              <a:defRPr sz="1667"/>
             </a:lvl7pPr>
-            <a:lvl8pPr marL="4560570" indent="0">
-              <a:buNone/>
-              <a:defRPr sz="1425"/>
+            <a:lvl8pPr marL="5334107" indent="0">
+              <a:buNone/>
+              <a:defRPr sz="1667"/>
             </a:lvl8pPr>
-            <a:lvl9pPr marL="5212080" indent="0">
-              <a:buNone/>
-              <a:defRPr sz="1425"/>
+            <a:lvl9pPr marL="6096122" indent="0">
+              <a:buNone/>
+              <a:defRPr sz="1667"/>
             </a:lvl9pPr>
           </a:lstStyle>
           <a:p>
@@ -2481,7 +2922,7 @@
           <a:p>
             <a:fld id="{A66A2E94-B547-E748-9FAE-0669CBE3935E}" type="datetimeFigureOut">
               <a:rPr lang="en-US" smtClean="0"/>
-              <a:t>5/9/25</a:t>
+              <a:t>5/22/25</a:t>
             </a:fld>
             <a:endParaRPr lang="en-US"/>
           </a:p>
@@ -2532,7 +2973,7 @@
     </p:spTree>
     <p:extLst>
       <p:ext uri="{BB962C8B-B14F-4D97-AF65-F5344CB8AC3E}">
-        <p14:creationId xmlns:p14="http://schemas.microsoft.com/office/powerpoint/2010/main" val="1096110911"/>
+        <p14:creationId xmlns:p14="http://schemas.microsoft.com/office/powerpoint/2010/main" val="2582783806"/>
       </p:ext>
     </p:extLst>
   </p:cSld>
@@ -2576,8 +3017,8 @@
         </p:nvSpPr>
         <p:spPr>
           <a:xfrm>
-            <a:off x="1194435" y="584201"/>
-            <a:ext cx="14984730" cy="2120901"/>
+            <a:off x="1194435" y="608544"/>
+            <a:ext cx="14984730" cy="2209272"/>
           </a:xfrm>
           <a:prstGeom prst="rect">
             <a:avLst/>
@@ -2609,8 +3050,8 @@
         </p:nvSpPr>
         <p:spPr>
           <a:xfrm>
-            <a:off x="1194435" y="2921000"/>
-            <a:ext cx="14984730" cy="6962141"/>
+            <a:off x="1194435" y="3042708"/>
+            <a:ext cx="14984730" cy="7252230"/>
           </a:xfrm>
           <a:prstGeom prst="rect">
             <a:avLst/>
@@ -2671,8 +3112,8 @@
         </p:nvSpPr>
         <p:spPr>
           <a:xfrm>
-            <a:off x="1194435" y="10170161"/>
-            <a:ext cx="3909060" cy="584200"/>
+            <a:off x="1194435" y="10593919"/>
+            <a:ext cx="3909060" cy="608542"/>
           </a:xfrm>
           <a:prstGeom prst="rect">
             <a:avLst/>
@@ -2682,7 +3123,7 @@
           <a:bodyPr vert="horz" lIns="91440" tIns="45720" rIns="91440" bIns="45720" rtlCol="0" anchor="ctr"/>
           <a:lstStyle>
             <a:lvl1pPr algn="l">
-              <a:defRPr sz="1710">
+              <a:defRPr sz="2000">
                 <a:solidFill>
                   <a:schemeClr val="tx1">
                     <a:tint val="82000"/>
@@ -2694,7 +3135,7 @@
           <a:p>
             <a:fld id="{A66A2E94-B547-E748-9FAE-0669CBE3935E}" type="datetimeFigureOut">
               <a:rPr lang="en-US" smtClean="0"/>
-              <a:t>5/9/25</a:t>
+              <a:t>5/22/25</a:t>
             </a:fld>
             <a:endParaRPr lang="en-US"/>
           </a:p>
@@ -2712,8 +3153,8 @@
         </p:nvSpPr>
         <p:spPr>
           <a:xfrm>
-            <a:off x="5755005" y="10170161"/>
-            <a:ext cx="5863590" cy="584200"/>
+            <a:off x="5755005" y="10593919"/>
+            <a:ext cx="5863590" cy="608542"/>
           </a:xfrm>
           <a:prstGeom prst="rect">
             <a:avLst/>
@@ -2723,7 +3164,7 @@
           <a:bodyPr vert="horz" lIns="91440" tIns="45720" rIns="91440" bIns="45720" rtlCol="0" anchor="ctr"/>
           <a:lstStyle>
             <a:lvl1pPr algn="ctr">
-              <a:defRPr sz="1710">
+              <a:defRPr sz="2000">
                 <a:solidFill>
                   <a:schemeClr val="tx1">
                     <a:tint val="82000"/>
@@ -2749,8 +3190,8 @@
         </p:nvSpPr>
         <p:spPr>
           <a:xfrm>
-            <a:off x="12270105" y="10170161"/>
-            <a:ext cx="3909060" cy="584200"/>
+            <a:off x="12270105" y="10593919"/>
+            <a:ext cx="3909060" cy="608542"/>
           </a:xfrm>
           <a:prstGeom prst="rect">
             <a:avLst/>
@@ -2760,7 +3201,7 @@
           <a:bodyPr vert="horz" lIns="91440" tIns="45720" rIns="91440" bIns="45720" rtlCol="0" anchor="ctr"/>
           <a:lstStyle>
             <a:lvl1pPr algn="r">
-              <a:defRPr sz="1710">
+              <a:defRPr sz="2000">
                 <a:solidFill>
                   <a:schemeClr val="tx1">
                     <a:tint val="82000"/>
@@ -2781,27 +3222,27 @@
     </p:spTree>
     <p:extLst>
       <p:ext uri="{BB962C8B-B14F-4D97-AF65-F5344CB8AC3E}">
-        <p14:creationId xmlns:p14="http://schemas.microsoft.com/office/powerpoint/2010/main" val="806875768"/>
+        <p14:creationId xmlns:p14="http://schemas.microsoft.com/office/powerpoint/2010/main" val="1907846388"/>
       </p:ext>
     </p:extLst>
   </p:cSld>
   <p:clrMap bg1="lt1" tx1="dk1" bg2="lt2" tx2="dk2" accent1="accent1" accent2="accent2" accent3="accent3" accent4="accent4" accent5="accent5" accent6="accent6" hlink="hlink" folHlink="folHlink"/>
   <p:sldLayoutIdLst>
-    <p:sldLayoutId id="2147483661" r:id="rId1"/>
-    <p:sldLayoutId id="2147483662" r:id="rId2"/>
-    <p:sldLayoutId id="2147483663" r:id="rId3"/>
-    <p:sldLayoutId id="2147483664" r:id="rId4"/>
-    <p:sldLayoutId id="2147483665" r:id="rId5"/>
-    <p:sldLayoutId id="2147483666" r:id="rId6"/>
-    <p:sldLayoutId id="2147483667" r:id="rId7"/>
-    <p:sldLayoutId id="2147483668" r:id="rId8"/>
-    <p:sldLayoutId id="2147483669" r:id="rId9"/>
-    <p:sldLayoutId id="2147483670" r:id="rId10"/>
-    <p:sldLayoutId id="2147483671" r:id="rId11"/>
+    <p:sldLayoutId id="2147483673" r:id="rId1"/>
+    <p:sldLayoutId id="2147483674" r:id="rId2"/>
+    <p:sldLayoutId id="2147483675" r:id="rId3"/>
+    <p:sldLayoutId id="2147483676" r:id="rId4"/>
+    <p:sldLayoutId id="2147483677" r:id="rId5"/>
+    <p:sldLayoutId id="2147483678" r:id="rId6"/>
+    <p:sldLayoutId id="2147483679" r:id="rId7"/>
+    <p:sldLayoutId id="2147483680" r:id="rId8"/>
+    <p:sldLayoutId id="2147483681" r:id="rId9"/>
+    <p:sldLayoutId id="2147483682" r:id="rId10"/>
+    <p:sldLayoutId id="2147483683" r:id="rId11"/>
   </p:sldLayoutIdLst>
   <p:txStyles>
     <p:titleStyle>
-      <a:lvl1pPr algn="l" defTabSz="1303020" rtl="0" eaLnBrk="1" latinLnBrk="0" hangingPunct="1">
+      <a:lvl1pPr algn="l" defTabSz="1524030" rtl="0" eaLnBrk="1" latinLnBrk="0" hangingPunct="1">
         <a:lnSpc>
           <a:spcPct val="90000"/>
         </a:lnSpc>
@@ -2809,7 +3250,7 @@
           <a:spcPct val="0"/>
         </a:spcBef>
         <a:buNone/>
-        <a:defRPr sz="6270" kern="1200">
+        <a:defRPr sz="7333" kern="1200">
           <a:solidFill>
             <a:schemeClr val="tx1"/>
           </a:solidFill>
@@ -2820,16 +3261,16 @@
       </a:lvl1pPr>
     </p:titleStyle>
     <p:bodyStyle>
-      <a:lvl1pPr marL="325755" indent="-325755" algn="l" defTabSz="1303020" rtl="0" eaLnBrk="1" latinLnBrk="0" hangingPunct="1">
+      <a:lvl1pPr marL="381008" indent="-381008" algn="l" defTabSz="1524030" rtl="0" eaLnBrk="1" latinLnBrk="0" hangingPunct="1">
         <a:lnSpc>
           <a:spcPct val="90000"/>
         </a:lnSpc>
         <a:spcBef>
-          <a:spcPts val="1425"/>
+          <a:spcPts val="1667"/>
         </a:spcBef>
         <a:buFont typeface="Arial" panose="020B0604020202020204" pitchFamily="34" charset="0"/>
         <a:buChar char="•"/>
-        <a:defRPr sz="3990" kern="1200">
+        <a:defRPr sz="4667" kern="1200">
           <a:solidFill>
             <a:schemeClr val="tx1"/>
           </a:solidFill>
@@ -2838,16 +3279,16 @@
           <a:cs typeface="+mn-cs"/>
         </a:defRPr>
       </a:lvl1pPr>
-      <a:lvl2pPr marL="977265" indent="-325755" algn="l" defTabSz="1303020" rtl="0" eaLnBrk="1" latinLnBrk="0" hangingPunct="1">
+      <a:lvl2pPr marL="1143023" indent="-381008" algn="l" defTabSz="1524030" rtl="0" eaLnBrk="1" latinLnBrk="0" hangingPunct="1">
         <a:lnSpc>
           <a:spcPct val="90000"/>
         </a:lnSpc>
         <a:spcBef>
-          <a:spcPts val="713"/>
+          <a:spcPts val="833"/>
         </a:spcBef>
         <a:buFont typeface="Arial" panose="020B0604020202020204" pitchFamily="34" charset="0"/>
         <a:buChar char="•"/>
-        <a:defRPr sz="3420" kern="1200">
+        <a:defRPr sz="4000" kern="1200">
           <a:solidFill>
             <a:schemeClr val="tx1"/>
           </a:solidFill>
@@ -2856,16 +3297,16 @@
           <a:cs typeface="+mn-cs"/>
         </a:defRPr>
       </a:lvl2pPr>
-      <a:lvl3pPr marL="1628775" indent="-325755" algn="l" defTabSz="1303020" rtl="0" eaLnBrk="1" latinLnBrk="0" hangingPunct="1">
+      <a:lvl3pPr marL="1905038" indent="-381008" algn="l" defTabSz="1524030" rtl="0" eaLnBrk="1" latinLnBrk="0" hangingPunct="1">
         <a:lnSpc>
           <a:spcPct val="90000"/>
         </a:lnSpc>
         <a:spcBef>
-          <a:spcPts val="713"/>
+          <a:spcPts val="833"/>
         </a:spcBef>
         <a:buFont typeface="Arial" panose="020B0604020202020204" pitchFamily="34" charset="0"/>
         <a:buChar char="•"/>
-        <a:defRPr sz="2850" kern="1200">
+        <a:defRPr sz="3333" kern="1200">
           <a:solidFill>
             <a:schemeClr val="tx1"/>
           </a:solidFill>
@@ -2874,16 +3315,16 @@
           <a:cs typeface="+mn-cs"/>
         </a:defRPr>
       </a:lvl3pPr>
-      <a:lvl4pPr marL="2280285" indent="-325755" algn="l" defTabSz="1303020" rtl="0" eaLnBrk="1" latinLnBrk="0" hangingPunct="1">
+      <a:lvl4pPr marL="2667053" indent="-381008" algn="l" defTabSz="1524030" rtl="0" eaLnBrk="1" latinLnBrk="0" hangingPunct="1">
         <a:lnSpc>
           <a:spcPct val="90000"/>
         </a:lnSpc>
         <a:spcBef>
-          <a:spcPts val="713"/>
+          <a:spcPts val="833"/>
         </a:spcBef>
         <a:buFont typeface="Arial" panose="020B0604020202020204" pitchFamily="34" charset="0"/>
         <a:buChar char="•"/>
-        <a:defRPr sz="2565" kern="1200">
+        <a:defRPr sz="3000" kern="1200">
           <a:solidFill>
             <a:schemeClr val="tx1"/>
           </a:solidFill>
@@ -2892,16 +3333,16 @@
           <a:cs typeface="+mn-cs"/>
         </a:defRPr>
       </a:lvl4pPr>
-      <a:lvl5pPr marL="2931795" indent="-325755" algn="l" defTabSz="1303020" rtl="0" eaLnBrk="1" latinLnBrk="0" hangingPunct="1">
+      <a:lvl5pPr marL="3429069" indent="-381008" algn="l" defTabSz="1524030" rtl="0" eaLnBrk="1" latinLnBrk="0" hangingPunct="1">
         <a:lnSpc>
           <a:spcPct val="90000"/>
         </a:lnSpc>
         <a:spcBef>
-          <a:spcPts val="713"/>
+          <a:spcPts val="833"/>
         </a:spcBef>
         <a:buFont typeface="Arial" panose="020B0604020202020204" pitchFamily="34" charset="0"/>
         <a:buChar char="•"/>
-        <a:defRPr sz="2565" kern="1200">
+        <a:defRPr sz="3000" kern="1200">
           <a:solidFill>
             <a:schemeClr val="tx1"/>
           </a:solidFill>
@@ -2910,16 +3351,16 @@
           <a:cs typeface="+mn-cs"/>
         </a:defRPr>
       </a:lvl5pPr>
-      <a:lvl6pPr marL="3583305" indent="-325755" algn="l" defTabSz="1303020" rtl="0" eaLnBrk="1" latinLnBrk="0" hangingPunct="1">
+      <a:lvl6pPr marL="4191084" indent="-381008" algn="l" defTabSz="1524030" rtl="0" eaLnBrk="1" latinLnBrk="0" hangingPunct="1">
         <a:lnSpc>
           <a:spcPct val="90000"/>
         </a:lnSpc>
         <a:spcBef>
-          <a:spcPts val="713"/>
+          <a:spcPts val="833"/>
         </a:spcBef>
         <a:buFont typeface="Arial" panose="020B0604020202020204" pitchFamily="34" charset="0"/>
         <a:buChar char="•"/>
-        <a:defRPr sz="2565" kern="1200">
+        <a:defRPr sz="3000" kern="1200">
           <a:solidFill>
             <a:schemeClr val="tx1"/>
           </a:solidFill>
@@ -2928,16 +3369,16 @@
           <a:cs typeface="+mn-cs"/>
         </a:defRPr>
       </a:lvl6pPr>
-      <a:lvl7pPr marL="4234815" indent="-325755" algn="l" defTabSz="1303020" rtl="0" eaLnBrk="1" latinLnBrk="0" hangingPunct="1">
+      <a:lvl7pPr marL="4953099" indent="-381008" algn="l" defTabSz="1524030" rtl="0" eaLnBrk="1" latinLnBrk="0" hangingPunct="1">
         <a:lnSpc>
           <a:spcPct val="90000"/>
         </a:lnSpc>
         <a:spcBef>
-          <a:spcPts val="713"/>
+          <a:spcPts val="833"/>
         </a:spcBef>
         <a:buFont typeface="Arial" panose="020B0604020202020204" pitchFamily="34" charset="0"/>
         <a:buChar char="•"/>
-        <a:defRPr sz="2565" kern="1200">
+        <a:defRPr sz="3000" kern="1200">
           <a:solidFill>
             <a:schemeClr val="tx1"/>
           </a:solidFill>
@@ -2946,16 +3387,16 @@
           <a:cs typeface="+mn-cs"/>
         </a:defRPr>
       </a:lvl7pPr>
-      <a:lvl8pPr marL="4886325" indent="-325755" algn="l" defTabSz="1303020" rtl="0" eaLnBrk="1" latinLnBrk="0" hangingPunct="1">
+      <a:lvl8pPr marL="5715114" indent="-381008" algn="l" defTabSz="1524030" rtl="0" eaLnBrk="1" latinLnBrk="0" hangingPunct="1">
         <a:lnSpc>
           <a:spcPct val="90000"/>
         </a:lnSpc>
         <a:spcBef>
-          <a:spcPts val="713"/>
+          <a:spcPts val="833"/>
         </a:spcBef>
         <a:buFont typeface="Arial" panose="020B0604020202020204" pitchFamily="34" charset="0"/>
         <a:buChar char="•"/>
-        <a:defRPr sz="2565" kern="1200">
+        <a:defRPr sz="3000" kern="1200">
           <a:solidFill>
             <a:schemeClr val="tx1"/>
           </a:solidFill>
@@ -2964,16 +3405,16 @@
           <a:cs typeface="+mn-cs"/>
         </a:defRPr>
       </a:lvl8pPr>
-      <a:lvl9pPr marL="5537835" indent="-325755" algn="l" defTabSz="1303020" rtl="0" eaLnBrk="1" latinLnBrk="0" hangingPunct="1">
+      <a:lvl9pPr marL="6477130" indent="-381008" algn="l" defTabSz="1524030" rtl="0" eaLnBrk="1" latinLnBrk="0" hangingPunct="1">
         <a:lnSpc>
           <a:spcPct val="90000"/>
         </a:lnSpc>
         <a:spcBef>
-          <a:spcPts val="713"/>
+          <a:spcPts val="833"/>
         </a:spcBef>
         <a:buFont typeface="Arial" panose="020B0604020202020204" pitchFamily="34" charset="0"/>
         <a:buChar char="•"/>
-        <a:defRPr sz="2565" kern="1200">
+        <a:defRPr sz="3000" kern="1200">
           <a:solidFill>
             <a:schemeClr val="tx1"/>
           </a:solidFill>
@@ -2987,8 +3428,8 @@
       <a:defPPr>
         <a:defRPr lang="en-US"/>
       </a:defPPr>
-      <a:lvl1pPr marL="0" algn="l" defTabSz="1303020" rtl="0" eaLnBrk="1" latinLnBrk="0" hangingPunct="1">
-        <a:defRPr sz="2565" kern="1200">
+      <a:lvl1pPr marL="0" algn="l" defTabSz="1524030" rtl="0" eaLnBrk="1" latinLnBrk="0" hangingPunct="1">
+        <a:defRPr sz="3000" kern="1200">
           <a:solidFill>
             <a:schemeClr val="tx1"/>
           </a:solidFill>
@@ -2997,8 +3438,8 @@
           <a:cs typeface="+mn-cs"/>
         </a:defRPr>
       </a:lvl1pPr>
-      <a:lvl2pPr marL="651510" algn="l" defTabSz="1303020" rtl="0" eaLnBrk="1" latinLnBrk="0" hangingPunct="1">
-        <a:defRPr sz="2565" kern="1200">
+      <a:lvl2pPr marL="762015" algn="l" defTabSz="1524030" rtl="0" eaLnBrk="1" latinLnBrk="0" hangingPunct="1">
+        <a:defRPr sz="3000" kern="1200">
           <a:solidFill>
             <a:schemeClr val="tx1"/>
           </a:solidFill>
@@ -3007,8 +3448,8 @@
           <a:cs typeface="+mn-cs"/>
         </a:defRPr>
       </a:lvl2pPr>
-      <a:lvl3pPr marL="1303020" algn="l" defTabSz="1303020" rtl="0" eaLnBrk="1" latinLnBrk="0" hangingPunct="1">
-        <a:defRPr sz="2565" kern="1200">
+      <a:lvl3pPr marL="1524030" algn="l" defTabSz="1524030" rtl="0" eaLnBrk="1" latinLnBrk="0" hangingPunct="1">
+        <a:defRPr sz="3000" kern="1200">
           <a:solidFill>
             <a:schemeClr val="tx1"/>
           </a:solidFill>
@@ -3017,8 +3458,8 @@
           <a:cs typeface="+mn-cs"/>
         </a:defRPr>
       </a:lvl3pPr>
-      <a:lvl4pPr marL="1954530" algn="l" defTabSz="1303020" rtl="0" eaLnBrk="1" latinLnBrk="0" hangingPunct="1">
-        <a:defRPr sz="2565" kern="1200">
+      <a:lvl4pPr marL="2286046" algn="l" defTabSz="1524030" rtl="0" eaLnBrk="1" latinLnBrk="0" hangingPunct="1">
+        <a:defRPr sz="3000" kern="1200">
           <a:solidFill>
             <a:schemeClr val="tx1"/>
           </a:solidFill>
@@ -3027,8 +3468,8 @@
           <a:cs typeface="+mn-cs"/>
         </a:defRPr>
       </a:lvl4pPr>
-      <a:lvl5pPr marL="2606040" algn="l" defTabSz="1303020" rtl="0" eaLnBrk="1" latinLnBrk="0" hangingPunct="1">
-        <a:defRPr sz="2565" kern="1200">
+      <a:lvl5pPr marL="3048061" algn="l" defTabSz="1524030" rtl="0" eaLnBrk="1" latinLnBrk="0" hangingPunct="1">
+        <a:defRPr sz="3000" kern="1200">
           <a:solidFill>
             <a:schemeClr val="tx1"/>
           </a:solidFill>
@@ -3037,8 +3478,8 @@
           <a:cs typeface="+mn-cs"/>
         </a:defRPr>
       </a:lvl5pPr>
-      <a:lvl6pPr marL="3257550" algn="l" defTabSz="1303020" rtl="0" eaLnBrk="1" latinLnBrk="0" hangingPunct="1">
-        <a:defRPr sz="2565" kern="1200">
+      <a:lvl6pPr marL="3810076" algn="l" defTabSz="1524030" rtl="0" eaLnBrk="1" latinLnBrk="0" hangingPunct="1">
+        <a:defRPr sz="3000" kern="1200">
           <a:solidFill>
             <a:schemeClr val="tx1"/>
           </a:solidFill>
@@ -3047,8 +3488,8 @@
           <a:cs typeface="+mn-cs"/>
         </a:defRPr>
       </a:lvl6pPr>
-      <a:lvl7pPr marL="3909060" algn="l" defTabSz="1303020" rtl="0" eaLnBrk="1" latinLnBrk="0" hangingPunct="1">
-        <a:defRPr sz="2565" kern="1200">
+      <a:lvl7pPr marL="4572091" algn="l" defTabSz="1524030" rtl="0" eaLnBrk="1" latinLnBrk="0" hangingPunct="1">
+        <a:defRPr sz="3000" kern="1200">
           <a:solidFill>
             <a:schemeClr val="tx1"/>
           </a:solidFill>
@@ -3057,8 +3498,8 @@
           <a:cs typeface="+mn-cs"/>
         </a:defRPr>
       </a:lvl7pPr>
-      <a:lvl8pPr marL="4560570" algn="l" defTabSz="1303020" rtl="0" eaLnBrk="1" latinLnBrk="0" hangingPunct="1">
-        <a:defRPr sz="2565" kern="1200">
+      <a:lvl8pPr marL="5334107" algn="l" defTabSz="1524030" rtl="0" eaLnBrk="1" latinLnBrk="0" hangingPunct="1">
+        <a:defRPr sz="3000" kern="1200">
           <a:solidFill>
             <a:schemeClr val="tx1"/>
           </a:solidFill>
@@ -3067,8 +3508,8 @@
           <a:cs typeface="+mn-cs"/>
         </a:defRPr>
       </a:lvl8pPr>
-      <a:lvl9pPr marL="5212080" algn="l" defTabSz="1303020" rtl="0" eaLnBrk="1" latinLnBrk="0" hangingPunct="1">
-        <a:defRPr sz="2565" kern="1200">
+      <a:lvl9pPr marL="6096122" algn="l" defTabSz="1524030" rtl="0" eaLnBrk="1" latinLnBrk="0" hangingPunct="1">
+        <a:defRPr sz="3000" kern="1200">
           <a:solidFill>
             <a:schemeClr val="tx1"/>
           </a:solidFill>
@@ -3101,10 +3542,10 @@
       </p:grpSpPr>
       <p:grpSp>
         <p:nvGrpSpPr>
-          <p:cNvPr id="18" name="Group 17">
+          <p:cNvPr id="5" name="Group 4">
             <a:extLst>
               <a:ext uri="{FF2B5EF4-FFF2-40B4-BE49-F238E27FC236}">
-                <a16:creationId xmlns:a16="http://schemas.microsoft.com/office/drawing/2014/main" id="{B69E6A22-7B8C-0FC4-59AE-DC5DEABABF56}"/>
+                <a16:creationId xmlns:a16="http://schemas.microsoft.com/office/drawing/2014/main" id="{7E54E683-1AA7-5516-1B7E-A1CD186BBF90}"/>
               </a:ext>
             </a:extLst>
           </p:cNvPr>
@@ -3113,18 +3554,18 @@
         </p:nvGrpSpPr>
         <p:grpSpPr>
           <a:xfrm>
-            <a:off x="399935" y="517237"/>
-            <a:ext cx="16450889" cy="10102229"/>
-            <a:chOff x="464589" y="304800"/>
-            <a:chExt cx="16450889" cy="10102229"/>
+            <a:off x="295726" y="590822"/>
+            <a:ext cx="16766936" cy="10619059"/>
+            <a:chOff x="295726" y="405471"/>
+            <a:chExt cx="16766936" cy="10619059"/>
           </a:xfrm>
         </p:grpSpPr>
         <p:pic>
           <p:nvPicPr>
-            <p:cNvPr id="5" name="Picture 4" descr="A graph of a graph&#10;&#10;AI-generated content may be incorrect.">
+            <p:cNvPr id="25" name="Picture 24" descr="A screenshot of a graph&#10;&#10;AI-generated content may be incorrect.">
               <a:extLst>
                 <a:ext uri="{FF2B5EF4-FFF2-40B4-BE49-F238E27FC236}">
-                  <a16:creationId xmlns:a16="http://schemas.microsoft.com/office/drawing/2014/main" id="{E4F0E282-94FB-76B7-FA0D-9D5E78F14A30}"/>
+                  <a16:creationId xmlns:a16="http://schemas.microsoft.com/office/drawing/2014/main" id="{0C869B22-4AEF-7F03-A48A-7069BF0FE132}"/>
                 </a:ext>
               </a:extLst>
             </p:cNvPr>
@@ -3141,298 +3582,391 @@
           </p:blipFill>
           <p:spPr>
             <a:xfrm>
-              <a:off x="464589" y="322876"/>
-              <a:ext cx="7979209" cy="10084153"/>
+              <a:off x="295726" y="405471"/>
+              <a:ext cx="16766936" cy="10619059"/>
             </a:xfrm>
             <a:prstGeom prst="rect">
               <a:avLst/>
             </a:prstGeom>
           </p:spPr>
         </p:pic>
-        <p:pic>
-          <p:nvPicPr>
-            <p:cNvPr id="10" name="Picture 9" descr="A screenshot of a graph&#10;&#10;AI-generated content may be incorrect.">
+        <p:grpSp>
+          <p:nvGrpSpPr>
+            <p:cNvPr id="34" name="Group 33">
               <a:extLst>
                 <a:ext uri="{FF2B5EF4-FFF2-40B4-BE49-F238E27FC236}">
-                  <a16:creationId xmlns:a16="http://schemas.microsoft.com/office/drawing/2014/main" id="{4F99A253-9ABE-148A-26E4-04618E3333AA}"/>
+                  <a16:creationId xmlns:a16="http://schemas.microsoft.com/office/drawing/2014/main" id="{D7CA7851-95BC-A4FD-8FA8-AA91936BA621}"/>
                 </a:ext>
               </a:extLst>
             </p:cNvPr>
-            <p:cNvPicPr>
-              <a:picLocks noChangeAspect="1"/>
-            </p:cNvPicPr>
+            <p:cNvGrpSpPr/>
             <p:nvPr/>
-          </p:nvPicPr>
-          <p:blipFill>
-            <a:blip r:embed="rId3"/>
-            <a:stretch>
-              <a:fillRect/>
-            </a:stretch>
-          </p:blipFill>
-          <p:spPr>
+          </p:nvGrpSpPr>
+          <p:grpSpPr>
             <a:xfrm>
-              <a:off x="8929803" y="322876"/>
-              <a:ext cx="7985675" cy="10084153"/>
+              <a:off x="5910150" y="8109678"/>
+              <a:ext cx="2184400" cy="593725"/>
+              <a:chOff x="6102350" y="7623175"/>
+              <a:chExt cx="2184400" cy="593725"/>
             </a:xfrm>
-            <a:prstGeom prst="rect">
-              <a:avLst/>
-            </a:prstGeom>
-          </p:spPr>
-        </p:pic>
-        <p:pic>
-          <p:nvPicPr>
-            <p:cNvPr id="11" name="Picture 10" descr="A screenshot of a graph&#10;&#10;AI-generated content may be incorrect.">
+          </p:grpSpPr>
+          <p:sp>
+            <p:nvSpPr>
+              <p:cNvPr id="29" name="Rectangle 28">
+                <a:extLst>
+                  <a:ext uri="{FF2B5EF4-FFF2-40B4-BE49-F238E27FC236}">
+                    <a16:creationId xmlns:a16="http://schemas.microsoft.com/office/drawing/2014/main" id="{EDCEE873-4003-AFC8-5B21-0A4F6CE8B0B4}"/>
+                  </a:ext>
+                </a:extLst>
+              </p:cNvPr>
+              <p:cNvSpPr/>
+              <p:nvPr/>
+            </p:nvSpPr>
+            <p:spPr>
+              <a:xfrm>
+                <a:off x="6102350" y="7623175"/>
+                <a:ext cx="2174875" cy="593725"/>
+              </a:xfrm>
+              <a:prstGeom prst="rect">
+                <a:avLst/>
+              </a:prstGeom>
+              <a:solidFill>
+                <a:schemeClr val="bg1"/>
+              </a:solidFill>
+              <a:ln>
+                <a:solidFill>
+                  <a:schemeClr val="bg1"/>
+                </a:solidFill>
+              </a:ln>
+            </p:spPr>
+            <p:style>
+              <a:lnRef idx="2">
+                <a:schemeClr val="accent1">
+                  <a:shade val="15000"/>
+                </a:schemeClr>
+              </a:lnRef>
+              <a:fillRef idx="1">
+                <a:schemeClr val="accent1"/>
+              </a:fillRef>
+              <a:effectRef idx="0">
+                <a:schemeClr val="accent1"/>
+              </a:effectRef>
+              <a:fontRef idx="minor">
+                <a:schemeClr val="lt1"/>
+              </a:fontRef>
+            </p:style>
+            <p:txBody>
+              <a:bodyPr rtlCol="0" anchor="ctr"/>
+              <a:lstStyle/>
+              <a:p>
+                <a:pPr algn="ctr"/>
+                <a:endParaRPr lang="en-US"/>
+              </a:p>
+            </p:txBody>
+          </p:sp>
+          <p:cxnSp>
+            <p:nvCxnSpPr>
+              <p:cNvPr id="23" name="Straight Connector 22">
+                <a:extLst>
+                  <a:ext uri="{FF2B5EF4-FFF2-40B4-BE49-F238E27FC236}">
+                    <a16:creationId xmlns:a16="http://schemas.microsoft.com/office/drawing/2014/main" id="{2FAD4DAA-E1E2-D772-B038-A476647BDA7D}"/>
+                  </a:ext>
+                </a:extLst>
+              </p:cNvPr>
+              <p:cNvCxnSpPr>
+                <a:cxnSpLocks/>
+              </p:cNvCxnSpPr>
+              <p:nvPr/>
+            </p:nvCxnSpPr>
+            <p:spPr>
+              <a:xfrm>
+                <a:off x="6227908" y="7792316"/>
+                <a:ext cx="230042" cy="0"/>
+              </a:xfrm>
+              <a:prstGeom prst="line">
+                <a:avLst/>
+              </a:prstGeom>
+              <a:ln w="47625">
+                <a:solidFill>
+                  <a:srgbClr val="0532FF"/>
+                </a:solidFill>
+              </a:ln>
+            </p:spPr>
+            <p:style>
+              <a:lnRef idx="2">
+                <a:schemeClr val="accent1"/>
+              </a:lnRef>
+              <a:fillRef idx="0">
+                <a:schemeClr val="accent1"/>
+              </a:fillRef>
+              <a:effectRef idx="1">
+                <a:schemeClr val="accent1"/>
+              </a:effectRef>
+              <a:fontRef idx="minor">
+                <a:schemeClr val="tx1"/>
+              </a:fontRef>
+            </p:style>
+          </p:cxnSp>
+          <p:cxnSp>
+            <p:nvCxnSpPr>
+              <p:cNvPr id="26" name="Straight Connector 25">
+                <a:extLst>
+                  <a:ext uri="{FF2B5EF4-FFF2-40B4-BE49-F238E27FC236}">
+                    <a16:creationId xmlns:a16="http://schemas.microsoft.com/office/drawing/2014/main" id="{8307D1C1-8B24-95B4-869B-6AF9E31826AB}"/>
+                  </a:ext>
+                </a:extLst>
+              </p:cNvPr>
+              <p:cNvCxnSpPr>
+                <a:cxnSpLocks/>
+              </p:cNvCxnSpPr>
+              <p:nvPr/>
+            </p:nvCxnSpPr>
+            <p:spPr>
+              <a:xfrm>
+                <a:off x="6224733" y="8065366"/>
+                <a:ext cx="230042" cy="0"/>
+              </a:xfrm>
+              <a:prstGeom prst="line">
+                <a:avLst/>
+              </a:prstGeom>
+              <a:ln w="47625">
+                <a:solidFill>
+                  <a:srgbClr val="FF2500"/>
+                </a:solidFill>
+              </a:ln>
+            </p:spPr>
+            <p:style>
+              <a:lnRef idx="2">
+                <a:schemeClr val="accent1"/>
+              </a:lnRef>
+              <a:fillRef idx="0">
+                <a:schemeClr val="accent1"/>
+              </a:fillRef>
+              <a:effectRef idx="1">
+                <a:schemeClr val="accent1"/>
+              </a:effectRef>
+              <a:fontRef idx="minor">
+                <a:schemeClr val="tx1"/>
+              </a:fontRef>
+            </p:style>
+          </p:cxnSp>
+          <p:sp>
+            <p:nvSpPr>
+              <p:cNvPr id="27" name="TextBox 26">
+                <a:extLst>
+                  <a:ext uri="{FF2B5EF4-FFF2-40B4-BE49-F238E27FC236}">
+                    <a16:creationId xmlns:a16="http://schemas.microsoft.com/office/drawing/2014/main" id="{A7E79CE9-6FC5-0B6A-1794-78FC98B6626F}"/>
+                  </a:ext>
+                </a:extLst>
+              </p:cNvPr>
+              <p:cNvSpPr txBox="1"/>
+              <p:nvPr/>
+            </p:nvSpPr>
+            <p:spPr>
+              <a:xfrm>
+                <a:off x="6467475" y="7651750"/>
+                <a:ext cx="1816100" cy="276999"/>
+              </a:xfrm>
+              <a:prstGeom prst="rect">
+                <a:avLst/>
+              </a:prstGeom>
+              <a:solidFill>
+                <a:schemeClr val="bg1"/>
+              </a:solidFill>
+            </p:spPr>
+            <p:txBody>
+              <a:bodyPr wrap="square" rtlCol="0">
+                <a:spAutoFit/>
+              </a:bodyPr>
+              <a:lstStyle/>
+              <a:p>
+                <a:r>
+                  <a:rPr lang="en-US" sz="1200" dirty="0">
+                    <a:latin typeface="Arial" panose="020B0604020202020204" pitchFamily="34" charset="0"/>
+                    <a:cs typeface="Arial" panose="020B0604020202020204" pitchFamily="34" charset="0"/>
+                  </a:rPr>
+                  <a:t>Negative Log Likelihood</a:t>
+                </a:r>
+              </a:p>
+            </p:txBody>
+          </p:sp>
+          <p:sp>
+            <p:nvSpPr>
+              <p:cNvPr id="28" name="TextBox 27">
+                <a:extLst>
+                  <a:ext uri="{FF2B5EF4-FFF2-40B4-BE49-F238E27FC236}">
+                    <a16:creationId xmlns:a16="http://schemas.microsoft.com/office/drawing/2014/main" id="{EE6EEDC4-5E6F-0A18-DA21-83AC8A36BDA2}"/>
+                  </a:ext>
+                </a:extLst>
+              </p:cNvPr>
+              <p:cNvSpPr txBox="1"/>
+              <p:nvPr/>
+            </p:nvSpPr>
+            <p:spPr>
+              <a:xfrm>
+                <a:off x="6470650" y="7927975"/>
+                <a:ext cx="1816100" cy="276999"/>
+              </a:xfrm>
+              <a:prstGeom prst="rect">
+                <a:avLst/>
+              </a:prstGeom>
+              <a:solidFill>
+                <a:schemeClr val="bg1"/>
+              </a:solidFill>
+            </p:spPr>
+            <p:txBody>
+              <a:bodyPr wrap="square" rtlCol="0">
+                <a:spAutoFit/>
+              </a:bodyPr>
+              <a:lstStyle/>
+              <a:p>
+                <a:r>
+                  <a:rPr lang="en-US" sz="1200" dirty="0">
+                    <a:latin typeface="Arial" panose="020B0604020202020204" pitchFamily="34" charset="0"/>
+                    <a:cs typeface="Arial" panose="020B0604020202020204" pitchFamily="34" charset="0"/>
+                  </a:rPr>
+                  <a:t>with penalty</a:t>
+                </a:r>
+              </a:p>
+            </p:txBody>
+          </p:sp>
+        </p:grpSp>
+        <p:grpSp>
+          <p:nvGrpSpPr>
+            <p:cNvPr id="33" name="Group 32">
               <a:extLst>
                 <a:ext uri="{FF2B5EF4-FFF2-40B4-BE49-F238E27FC236}">
-                  <a16:creationId xmlns:a16="http://schemas.microsoft.com/office/drawing/2014/main" id="{605C9A08-B017-6103-FE01-92447CE078D0}"/>
+                  <a16:creationId xmlns:a16="http://schemas.microsoft.com/office/drawing/2014/main" id="{6669CF29-2FC9-85D2-5EFA-3B278C497365}"/>
                 </a:ext>
               </a:extLst>
             </p:cNvPr>
-            <p:cNvPicPr>
-              <a:picLocks noChangeAspect="1"/>
-            </p:cNvPicPr>
+            <p:cNvGrpSpPr/>
             <p:nvPr/>
-          </p:nvPicPr>
-          <p:blipFill>
-            <a:blip r:embed="rId3"/>
-            <a:srcRect l="25805" t="-133" r="21685" b="97569"/>
-            <a:stretch/>
-          </p:blipFill>
-          <p:spPr>
+          </p:nvGrpSpPr>
+          <p:grpSpPr>
             <a:xfrm>
-              <a:off x="10757564" y="304800"/>
-              <a:ext cx="4792365" cy="295564"/>
+              <a:off x="15304585" y="1195597"/>
+              <a:ext cx="1299971" cy="600364"/>
+              <a:chOff x="3914341" y="7596397"/>
+              <a:chExt cx="1299971" cy="600364"/>
             </a:xfrm>
-            <a:prstGeom prst="rect">
-              <a:avLst/>
-            </a:prstGeom>
-          </p:spPr>
-        </p:pic>
-        <p:pic>
-          <p:nvPicPr>
-            <p:cNvPr id="14" name="Picture 13" descr="A screenshot of a graph&#10;&#10;AI-generated content may be incorrect.">
-              <a:extLst>
-                <a:ext uri="{FF2B5EF4-FFF2-40B4-BE49-F238E27FC236}">
-                  <a16:creationId xmlns:a16="http://schemas.microsoft.com/office/drawing/2014/main" id="{6DA7785D-F955-68F4-C76B-8D5A38F58EFC}"/>
-                </a:ext>
-              </a:extLst>
-            </p:cNvPr>
-            <p:cNvPicPr>
-              <a:picLocks noChangeAspect="1"/>
-            </p:cNvPicPr>
-            <p:nvPr/>
-          </p:nvPicPr>
-          <p:blipFill>
-            <a:blip r:embed="rId3"/>
-            <a:srcRect l="20521" t="66532" r="17239" b="30624"/>
-            <a:stretch/>
-          </p:blipFill>
-          <p:spPr>
-            <a:xfrm>
-              <a:off x="10132290" y="7015017"/>
-              <a:ext cx="5680364" cy="327892"/>
-            </a:xfrm>
-            <a:prstGeom prst="rect">
-              <a:avLst/>
-            </a:prstGeom>
-          </p:spPr>
-        </p:pic>
-        <p:pic>
-          <p:nvPicPr>
-            <p:cNvPr id="15" name="Picture 14" descr="A screenshot of a graph&#10;&#10;AI-generated content may be incorrect.">
-              <a:extLst>
-                <a:ext uri="{FF2B5EF4-FFF2-40B4-BE49-F238E27FC236}">
-                  <a16:creationId xmlns:a16="http://schemas.microsoft.com/office/drawing/2014/main" id="{5FFEA6E9-9553-71A1-7561-EF7A5EC74116}"/>
-                </a:ext>
-              </a:extLst>
-            </p:cNvPr>
-            <p:cNvPicPr>
-              <a:picLocks noChangeAspect="1"/>
-            </p:cNvPicPr>
-            <p:nvPr/>
-          </p:nvPicPr>
-          <p:blipFill>
-            <a:blip r:embed="rId3"/>
-            <a:srcRect l="21585" t="33359" r="18401" b="64077"/>
-            <a:stretch/>
-          </p:blipFill>
-          <p:spPr>
-            <a:xfrm>
-              <a:off x="10427855" y="3685309"/>
-              <a:ext cx="5477164" cy="295564"/>
-            </a:xfrm>
-            <a:prstGeom prst="rect">
-              <a:avLst/>
-            </a:prstGeom>
-          </p:spPr>
-        </p:pic>
-      </p:grpSp>
-      <p:grpSp>
-        <p:nvGrpSpPr>
-          <p:cNvPr id="34" name="Group 33">
-            <a:extLst>
-              <a:ext uri="{FF2B5EF4-FFF2-40B4-BE49-F238E27FC236}">
-                <a16:creationId xmlns:a16="http://schemas.microsoft.com/office/drawing/2014/main" id="{D7CA7851-95BC-A4FD-8FA8-AA91936BA621}"/>
-              </a:ext>
-            </a:extLst>
-          </p:cNvPr>
-          <p:cNvGrpSpPr/>
-          <p:nvPr/>
-        </p:nvGrpSpPr>
-        <p:grpSpPr>
-          <a:xfrm>
-            <a:off x="6052654" y="7762323"/>
-            <a:ext cx="2184400" cy="593725"/>
-            <a:chOff x="6102350" y="7623175"/>
-            <a:chExt cx="2184400" cy="593725"/>
-          </a:xfrm>
-        </p:grpSpPr>
-        <p:sp>
-          <p:nvSpPr>
-            <p:cNvPr id="29" name="Rectangle 28">
-              <a:extLst>
-                <a:ext uri="{FF2B5EF4-FFF2-40B4-BE49-F238E27FC236}">
-                  <a16:creationId xmlns:a16="http://schemas.microsoft.com/office/drawing/2014/main" id="{EDCEE873-4003-AFC8-5B21-0A4F6CE8B0B4}"/>
-                </a:ext>
-              </a:extLst>
-            </p:cNvPr>
-            <p:cNvSpPr/>
-            <p:nvPr/>
-          </p:nvSpPr>
-          <p:spPr>
-            <a:xfrm>
-              <a:off x="6102350" y="7623175"/>
-              <a:ext cx="2174875" cy="593725"/>
-            </a:xfrm>
-            <a:prstGeom prst="rect">
-              <a:avLst/>
-            </a:prstGeom>
-            <a:solidFill>
-              <a:schemeClr val="bg1"/>
-            </a:solidFill>
-            <a:ln>
+          </p:grpSpPr>
+          <p:pic>
+            <p:nvPicPr>
+              <p:cNvPr id="21" name="Picture 20" descr="A diagram of a method and bootstrap&#10;&#10;AI-generated content may be incorrect.">
+                <a:extLst>
+                  <a:ext uri="{FF2B5EF4-FFF2-40B4-BE49-F238E27FC236}">
+                    <a16:creationId xmlns:a16="http://schemas.microsoft.com/office/drawing/2014/main" id="{97D5621D-EA7B-B417-5588-DD55781CE5F2}"/>
+                  </a:ext>
+                </a:extLst>
+              </p:cNvPr>
+              <p:cNvPicPr>
+                <a:picLocks noChangeAspect="1"/>
+              </p:cNvPicPr>
+              <p:nvPr/>
+            </p:nvPicPr>
+            <p:blipFill>
+              <a:blip r:embed="rId3"/>
+              <a:srcRect t="30070" b="12443"/>
+              <a:stretch/>
+            </p:blipFill>
+            <p:spPr>
+              <a:xfrm>
+                <a:off x="3914341" y="7596397"/>
+                <a:ext cx="1299971" cy="600364"/>
+              </a:xfrm>
+              <a:prstGeom prst="rect">
+                <a:avLst/>
+              </a:prstGeom>
+            </p:spPr>
+          </p:pic>
+          <p:sp>
+            <p:nvSpPr>
+              <p:cNvPr id="31" name="TextBox 30">
+                <a:extLst>
+                  <a:ext uri="{FF2B5EF4-FFF2-40B4-BE49-F238E27FC236}">
+                    <a16:creationId xmlns:a16="http://schemas.microsoft.com/office/drawing/2014/main" id="{E66B3103-4C44-E2A1-FBEA-6CA1E15E6AA4}"/>
+                  </a:ext>
+                </a:extLst>
+              </p:cNvPr>
+              <p:cNvSpPr txBox="1"/>
+              <p:nvPr/>
+            </p:nvSpPr>
+            <p:spPr>
+              <a:xfrm>
+                <a:off x="4283018" y="7885466"/>
+                <a:ext cx="911230" cy="276999"/>
+              </a:xfrm>
+              <a:prstGeom prst="rect">
+                <a:avLst/>
+              </a:prstGeom>
               <a:solidFill>
                 <a:schemeClr val="bg1"/>
               </a:solidFill>
-            </a:ln>
-          </p:spPr>
-          <p:style>
-            <a:lnRef idx="2">
-              <a:schemeClr val="accent1">
-                <a:shade val="15000"/>
-              </a:schemeClr>
-            </a:lnRef>
-            <a:fillRef idx="1">
-              <a:schemeClr val="accent1"/>
-            </a:fillRef>
-            <a:effectRef idx="0">
-              <a:schemeClr val="accent1"/>
-            </a:effectRef>
-            <a:fontRef idx="minor">
-              <a:schemeClr val="lt1"/>
-            </a:fontRef>
-          </p:style>
-          <p:txBody>
-            <a:bodyPr rtlCol="0" anchor="ctr"/>
-            <a:lstStyle/>
-            <a:p>
-              <a:pPr algn="ctr"/>
-              <a:endParaRPr lang="en-US"/>
-            </a:p>
-          </p:txBody>
-        </p:sp>
-        <p:cxnSp>
-          <p:nvCxnSpPr>
-            <p:cNvPr id="23" name="Straight Connector 22">
+            </p:spPr>
+            <p:txBody>
+              <a:bodyPr wrap="square" rtlCol="0">
+                <a:spAutoFit/>
+              </a:bodyPr>
+              <a:lstStyle/>
+              <a:p>
+                <a:r>
+                  <a:rPr lang="en-US" sz="1200" dirty="0">
+                    <a:latin typeface="Arial" panose="020B0604020202020204" pitchFamily="34" charset="0"/>
+                    <a:cs typeface="Arial" panose="020B0604020202020204" pitchFamily="34" charset="0"/>
+                  </a:rPr>
+                  <a:t>MCMC</a:t>
+                </a:r>
+              </a:p>
+            </p:txBody>
+          </p:sp>
+          <p:sp>
+            <p:nvSpPr>
+              <p:cNvPr id="32" name="TextBox 31">
+                <a:extLst>
+                  <a:ext uri="{FF2B5EF4-FFF2-40B4-BE49-F238E27FC236}">
+                    <a16:creationId xmlns:a16="http://schemas.microsoft.com/office/drawing/2014/main" id="{97BB1EA6-3ECB-6D66-AA14-D9EB6B559A52}"/>
+                  </a:ext>
+                </a:extLst>
+              </p:cNvPr>
+              <p:cNvSpPr txBox="1"/>
+              <p:nvPr/>
+            </p:nvSpPr>
+            <p:spPr>
+              <a:xfrm>
+                <a:off x="4276062" y="7620505"/>
+                <a:ext cx="911230" cy="276999"/>
+              </a:xfrm>
+              <a:prstGeom prst="rect">
+                <a:avLst/>
+              </a:prstGeom>
+              <a:solidFill>
+                <a:schemeClr val="bg1"/>
+              </a:solidFill>
+            </p:spPr>
+            <p:txBody>
+              <a:bodyPr wrap="square" rtlCol="0">
+                <a:spAutoFit/>
+              </a:bodyPr>
+              <a:lstStyle/>
+              <a:p>
+                <a:r>
+                  <a:rPr lang="en-US" sz="1200" dirty="0">
+                    <a:latin typeface="Arial" panose="020B0604020202020204" pitchFamily="34" charset="0"/>
+                    <a:cs typeface="Arial" panose="020B0604020202020204" pitchFamily="34" charset="0"/>
+                  </a:rPr>
+                  <a:t>Bootstrap</a:t>
+                </a:r>
+              </a:p>
+            </p:txBody>
+          </p:sp>
+        </p:grpSp>
+        <p:sp>
+          <p:nvSpPr>
+            <p:cNvPr id="2" name="TextBox 1">
               <a:extLst>
                 <a:ext uri="{FF2B5EF4-FFF2-40B4-BE49-F238E27FC236}">
-                  <a16:creationId xmlns:a16="http://schemas.microsoft.com/office/drawing/2014/main" id="{2FAD4DAA-E1E2-D772-B038-A476647BDA7D}"/>
-                </a:ext>
-              </a:extLst>
-            </p:cNvPr>
-            <p:cNvCxnSpPr>
-              <a:cxnSpLocks/>
-            </p:cNvCxnSpPr>
-            <p:nvPr/>
-          </p:nvCxnSpPr>
-          <p:spPr>
-            <a:xfrm>
-              <a:off x="6227908" y="7792316"/>
-              <a:ext cx="230042" cy="0"/>
-            </a:xfrm>
-            <a:prstGeom prst="line">
-              <a:avLst/>
-            </a:prstGeom>
-            <a:ln w="47625">
-              <a:solidFill>
-                <a:srgbClr val="0532FF"/>
-              </a:solidFill>
-            </a:ln>
-          </p:spPr>
-          <p:style>
-            <a:lnRef idx="2">
-              <a:schemeClr val="accent1"/>
-            </a:lnRef>
-            <a:fillRef idx="0">
-              <a:schemeClr val="accent1"/>
-            </a:fillRef>
-            <a:effectRef idx="1">
-              <a:schemeClr val="accent1"/>
-            </a:effectRef>
-            <a:fontRef idx="minor">
-              <a:schemeClr val="tx1"/>
-            </a:fontRef>
-          </p:style>
-        </p:cxnSp>
-        <p:cxnSp>
-          <p:nvCxnSpPr>
-            <p:cNvPr id="26" name="Straight Connector 25">
-              <a:extLst>
-                <a:ext uri="{FF2B5EF4-FFF2-40B4-BE49-F238E27FC236}">
-                  <a16:creationId xmlns:a16="http://schemas.microsoft.com/office/drawing/2014/main" id="{8307D1C1-8B24-95B4-869B-6AF9E31826AB}"/>
-                </a:ext>
-              </a:extLst>
-            </p:cNvPr>
-            <p:cNvCxnSpPr>
-              <a:cxnSpLocks/>
-            </p:cNvCxnSpPr>
-            <p:nvPr/>
-          </p:nvCxnSpPr>
-          <p:spPr>
-            <a:xfrm>
-              <a:off x="6224733" y="8065366"/>
-              <a:ext cx="230042" cy="0"/>
-            </a:xfrm>
-            <a:prstGeom prst="line">
-              <a:avLst/>
-            </a:prstGeom>
-            <a:ln w="47625">
-              <a:solidFill>
-                <a:srgbClr val="FF2500"/>
-              </a:solidFill>
-            </a:ln>
-          </p:spPr>
-          <p:style>
-            <a:lnRef idx="2">
-              <a:schemeClr val="accent1"/>
-            </a:lnRef>
-            <a:fillRef idx="0">
-              <a:schemeClr val="accent1"/>
-            </a:fillRef>
-            <a:effectRef idx="1">
-              <a:schemeClr val="accent1"/>
-            </a:effectRef>
-            <a:fontRef idx="minor">
-              <a:schemeClr val="tx1"/>
-            </a:fontRef>
-          </p:style>
-        </p:cxnSp>
-        <p:sp>
-          <p:nvSpPr>
-            <p:cNvPr id="27" name="TextBox 26">
-              <a:extLst>
-                <a:ext uri="{FF2B5EF4-FFF2-40B4-BE49-F238E27FC236}">
-                  <a16:creationId xmlns:a16="http://schemas.microsoft.com/office/drawing/2014/main" id="{A7E79CE9-6FC5-0B6A-1794-78FC98B6626F}"/>
+                  <a16:creationId xmlns:a16="http://schemas.microsoft.com/office/drawing/2014/main" id="{BD2123D2-E6F0-499C-B074-B87DAF1CAF17}"/>
                 </a:ext>
               </a:extLst>
             </p:cNvPr>
@@ -3441,38 +3975,36 @@
           </p:nvSpPr>
           <p:spPr>
             <a:xfrm>
-              <a:off x="6467475" y="7651750"/>
-              <a:ext cx="1816100" cy="276999"/>
+              <a:off x="322173" y="693564"/>
+              <a:ext cx="356188" cy="400110"/>
             </a:xfrm>
             <a:prstGeom prst="rect">
               <a:avLst/>
             </a:prstGeom>
-            <a:solidFill>
-              <a:schemeClr val="bg1"/>
-            </a:solidFill>
+            <a:noFill/>
           </p:spPr>
           <p:txBody>
-            <a:bodyPr wrap="square" rtlCol="0">
+            <a:bodyPr wrap="none" rtlCol="0">
               <a:spAutoFit/>
             </a:bodyPr>
             <a:lstStyle/>
             <a:p>
               <a:r>
-                <a:rPr lang="en-US" sz="1200" dirty="0">
+                <a:rPr lang="en-US" sz="2000" dirty="0">
                   <a:latin typeface="Arial" panose="020B0604020202020204" pitchFamily="34" charset="0"/>
                   <a:cs typeface="Arial" panose="020B0604020202020204" pitchFamily="34" charset="0"/>
                 </a:rPr>
-                <a:t>Negative Log Likelihood</a:t>
+                <a:t>A</a:t>
               </a:r>
             </a:p>
           </p:txBody>
         </p:sp>
         <p:sp>
           <p:nvSpPr>
-            <p:cNvPr id="28" name="TextBox 27">
+            <p:cNvPr id="3" name="TextBox 2">
               <a:extLst>
                 <a:ext uri="{FF2B5EF4-FFF2-40B4-BE49-F238E27FC236}">
-                  <a16:creationId xmlns:a16="http://schemas.microsoft.com/office/drawing/2014/main" id="{EE6EEDC4-5E6F-0A18-DA21-83AC8A36BDA2}"/>
+                  <a16:creationId xmlns:a16="http://schemas.microsoft.com/office/drawing/2014/main" id="{7CBAADB1-5585-736D-563A-3E93AD096F15}"/>
                 </a:ext>
               </a:extLst>
             </p:cNvPr>
@@ -3481,88 +4013,36 @@
           </p:nvSpPr>
           <p:spPr>
             <a:xfrm>
-              <a:off x="6470650" y="7927975"/>
-              <a:ext cx="1816100" cy="276999"/>
+              <a:off x="8679194" y="7419945"/>
+              <a:ext cx="341760" cy="400110"/>
             </a:xfrm>
             <a:prstGeom prst="rect">
               <a:avLst/>
             </a:prstGeom>
-            <a:solidFill>
-              <a:schemeClr val="bg1"/>
-            </a:solidFill>
+            <a:noFill/>
           </p:spPr>
           <p:txBody>
-            <a:bodyPr wrap="square" rtlCol="0">
+            <a:bodyPr wrap="none" rtlCol="0">
               <a:spAutoFit/>
             </a:bodyPr>
             <a:lstStyle/>
             <a:p>
               <a:r>
-                <a:rPr lang="en-US" sz="1200" dirty="0">
+                <a:rPr lang="en-US" sz="2000" dirty="0">
                   <a:latin typeface="Arial" panose="020B0604020202020204" pitchFamily="34" charset="0"/>
                   <a:cs typeface="Arial" panose="020B0604020202020204" pitchFamily="34" charset="0"/>
                 </a:rPr>
-                <a:t>with penalty</a:t>
+                <a:t>F</a:t>
               </a:r>
             </a:p>
           </p:txBody>
         </p:sp>
-      </p:grpSp>
-      <p:grpSp>
-        <p:nvGrpSpPr>
-          <p:cNvPr id="33" name="Group 32">
-            <a:extLst>
-              <a:ext uri="{FF2B5EF4-FFF2-40B4-BE49-F238E27FC236}">
-                <a16:creationId xmlns:a16="http://schemas.microsoft.com/office/drawing/2014/main" id="{6669CF29-2FC9-85D2-5EFA-3B278C497365}"/>
-              </a:ext>
-            </a:extLst>
-          </p:cNvPr>
-          <p:cNvGrpSpPr/>
-          <p:nvPr/>
-        </p:nvGrpSpPr>
-        <p:grpSpPr>
-          <a:xfrm>
-            <a:off x="15304584" y="966997"/>
-            <a:ext cx="1299971" cy="600364"/>
-            <a:chOff x="3914341" y="7596397"/>
-            <a:chExt cx="1299971" cy="600364"/>
-          </a:xfrm>
-        </p:grpSpPr>
-        <p:pic>
-          <p:nvPicPr>
-            <p:cNvPr id="21" name="Picture 20" descr="A diagram of a method and bootstrap&#10;&#10;AI-generated content may be incorrect.">
+        <p:sp>
+          <p:nvSpPr>
+            <p:cNvPr id="4" name="TextBox 3">
               <a:extLst>
                 <a:ext uri="{FF2B5EF4-FFF2-40B4-BE49-F238E27FC236}">
-                  <a16:creationId xmlns:a16="http://schemas.microsoft.com/office/drawing/2014/main" id="{97D5621D-EA7B-B417-5588-DD55781CE5F2}"/>
-                </a:ext>
-              </a:extLst>
-            </p:cNvPr>
-            <p:cNvPicPr>
-              <a:picLocks noChangeAspect="1"/>
-            </p:cNvPicPr>
-            <p:nvPr/>
-          </p:nvPicPr>
-          <p:blipFill>
-            <a:blip r:embed="rId4"/>
-            <a:srcRect t="30070" b="12443"/>
-            <a:stretch/>
-          </p:blipFill>
-          <p:spPr>
-            <a:xfrm>
-              <a:off x="3914341" y="7596397"/>
-              <a:ext cx="1299971" cy="600364"/>
-            </a:xfrm>
-            <a:prstGeom prst="rect">
-              <a:avLst/>
-            </a:prstGeom>
-          </p:spPr>
-        </p:pic>
-        <p:sp>
-          <p:nvSpPr>
-            <p:cNvPr id="31" name="TextBox 30">
-              <a:extLst>
-                <a:ext uri="{FF2B5EF4-FFF2-40B4-BE49-F238E27FC236}">
-                  <a16:creationId xmlns:a16="http://schemas.microsoft.com/office/drawing/2014/main" id="{E66B3103-4C44-E2A1-FBEA-6CA1E15E6AA4}"/>
+                  <a16:creationId xmlns:a16="http://schemas.microsoft.com/office/drawing/2014/main" id="{1995DD2D-D210-0BD3-C0BF-88970E4275EB}"/>
                 </a:ext>
               </a:extLst>
             </p:cNvPr>
@@ -3571,38 +4051,36 @@
           </p:nvSpPr>
           <p:spPr>
             <a:xfrm>
-              <a:off x="4283018" y="7885466"/>
-              <a:ext cx="911230" cy="276999"/>
+              <a:off x="8680693" y="4069080"/>
+              <a:ext cx="356188" cy="400110"/>
             </a:xfrm>
             <a:prstGeom prst="rect">
               <a:avLst/>
             </a:prstGeom>
-            <a:solidFill>
-              <a:schemeClr val="bg1"/>
-            </a:solidFill>
+            <a:noFill/>
           </p:spPr>
           <p:txBody>
-            <a:bodyPr wrap="square" rtlCol="0">
+            <a:bodyPr wrap="none" rtlCol="0">
               <a:spAutoFit/>
             </a:bodyPr>
             <a:lstStyle/>
             <a:p>
               <a:r>
-                <a:rPr lang="en-US" sz="1200" dirty="0">
+                <a:rPr lang="en-US" sz="2000" dirty="0">
                   <a:latin typeface="Arial" panose="020B0604020202020204" pitchFamily="34" charset="0"/>
                   <a:cs typeface="Arial" panose="020B0604020202020204" pitchFamily="34" charset="0"/>
                 </a:rPr>
-                <a:t>MCMC</a:t>
+                <a:t>E</a:t>
               </a:r>
             </a:p>
           </p:txBody>
         </p:sp>
         <p:sp>
           <p:nvSpPr>
-            <p:cNvPr id="32" name="TextBox 31">
+            <p:cNvPr id="6" name="TextBox 5">
               <a:extLst>
                 <a:ext uri="{FF2B5EF4-FFF2-40B4-BE49-F238E27FC236}">
-                  <a16:creationId xmlns:a16="http://schemas.microsoft.com/office/drawing/2014/main" id="{97BB1EA6-3ECB-6D66-AA14-D9EB6B559A52}"/>
+                  <a16:creationId xmlns:a16="http://schemas.microsoft.com/office/drawing/2014/main" id="{C89F8798-F60C-D3ED-DA8A-3F1C07AF6A4F}"/>
                 </a:ext>
               </a:extLst>
             </p:cNvPr>
@@ -3611,377 +4089,164 @@
           </p:nvSpPr>
           <p:spPr>
             <a:xfrm>
-              <a:off x="4276062" y="7620505"/>
-              <a:ext cx="911230" cy="276999"/>
+              <a:off x="8714853" y="693564"/>
+              <a:ext cx="370614" cy="400110"/>
             </a:xfrm>
             <a:prstGeom prst="rect">
               <a:avLst/>
             </a:prstGeom>
-            <a:solidFill>
-              <a:schemeClr val="bg1"/>
-            </a:solidFill>
+            <a:noFill/>
           </p:spPr>
           <p:txBody>
-            <a:bodyPr wrap="square" rtlCol="0">
+            <a:bodyPr wrap="none" rtlCol="0">
               <a:spAutoFit/>
             </a:bodyPr>
             <a:lstStyle/>
             <a:p>
               <a:r>
-                <a:rPr lang="en-US" sz="1200" dirty="0">
+                <a:rPr lang="en-US" sz="2000" dirty="0">
                   <a:latin typeface="Arial" panose="020B0604020202020204" pitchFamily="34" charset="0"/>
                   <a:cs typeface="Arial" panose="020B0604020202020204" pitchFamily="34" charset="0"/>
                 </a:rPr>
-                <a:t>Bootstrap</a:t>
+                <a:t>D</a:t>
+              </a:r>
+            </a:p>
+          </p:txBody>
+        </p:sp>
+        <p:sp>
+          <p:nvSpPr>
+            <p:cNvPr id="7" name="TextBox 6">
+              <a:extLst>
+                <a:ext uri="{FF2B5EF4-FFF2-40B4-BE49-F238E27FC236}">
+                  <a16:creationId xmlns:a16="http://schemas.microsoft.com/office/drawing/2014/main" id="{1CC9737E-0380-0DC8-8278-9FF97AF9C833}"/>
+                </a:ext>
+              </a:extLst>
+            </p:cNvPr>
+            <p:cNvSpPr txBox="1"/>
+            <p:nvPr/>
+          </p:nvSpPr>
+          <p:spPr>
+            <a:xfrm>
+              <a:off x="314960" y="7419945"/>
+              <a:ext cx="370614" cy="400110"/>
+            </a:xfrm>
+            <a:prstGeom prst="rect">
+              <a:avLst/>
+            </a:prstGeom>
+            <a:noFill/>
+          </p:spPr>
+          <p:txBody>
+            <a:bodyPr wrap="none" rtlCol="0">
+              <a:spAutoFit/>
+            </a:bodyPr>
+            <a:lstStyle/>
+            <a:p>
+              <a:r>
+                <a:rPr lang="en-US" sz="2000" dirty="0">
+                  <a:latin typeface="Arial" panose="020B0604020202020204" pitchFamily="34" charset="0"/>
+                  <a:cs typeface="Arial" panose="020B0604020202020204" pitchFamily="34" charset="0"/>
+                </a:rPr>
+                <a:t>C</a:t>
+              </a:r>
+            </a:p>
+          </p:txBody>
+        </p:sp>
+        <p:sp>
+          <p:nvSpPr>
+            <p:cNvPr id="8" name="TextBox 7">
+              <a:extLst>
+                <a:ext uri="{FF2B5EF4-FFF2-40B4-BE49-F238E27FC236}">
+                  <a16:creationId xmlns:a16="http://schemas.microsoft.com/office/drawing/2014/main" id="{2ACA91A2-C9D2-A85D-BA1B-166C6D4B90CB}"/>
+                </a:ext>
+              </a:extLst>
+            </p:cNvPr>
+            <p:cNvSpPr txBox="1"/>
+            <p:nvPr/>
+          </p:nvSpPr>
+          <p:spPr>
+            <a:xfrm>
+              <a:off x="322173" y="4069080"/>
+              <a:ext cx="356188" cy="400110"/>
+            </a:xfrm>
+            <a:prstGeom prst="rect">
+              <a:avLst/>
+            </a:prstGeom>
+            <a:noFill/>
+          </p:spPr>
+          <p:txBody>
+            <a:bodyPr wrap="none" rtlCol="0">
+              <a:spAutoFit/>
+            </a:bodyPr>
+            <a:lstStyle/>
+            <a:p>
+              <a:r>
+                <a:rPr lang="en-US" sz="2000" dirty="0">
+                  <a:latin typeface="Arial" panose="020B0604020202020204" pitchFamily="34" charset="0"/>
+                  <a:cs typeface="Arial" panose="020B0604020202020204" pitchFamily="34" charset="0"/>
+                </a:rPr>
+                <a:t>B</a:t>
               </a:r>
             </a:p>
           </p:txBody>
         </p:sp>
       </p:grpSp>
-      <p:sp>
-        <p:nvSpPr>
-          <p:cNvPr id="2" name="TextBox 1">
+      <p:pic>
+        <p:nvPicPr>
+          <p:cNvPr id="38" name="Picture 37">
             <a:extLst>
               <a:ext uri="{FF2B5EF4-FFF2-40B4-BE49-F238E27FC236}">
-                <a16:creationId xmlns:a16="http://schemas.microsoft.com/office/drawing/2014/main" id="{BD2123D2-E6F0-499C-B074-B87DAF1CAF17}"/>
+                <a16:creationId xmlns:a16="http://schemas.microsoft.com/office/drawing/2014/main" id="{876BEA00-93CC-3E62-C426-5B22BFD78E85}"/>
               </a:ext>
             </a:extLst>
           </p:cNvPr>
-          <p:cNvSpPr txBox="1"/>
+          <p:cNvPicPr>
+            <a:picLocks noChangeAspect="1"/>
+          </p:cNvPicPr>
           <p:nvPr/>
-        </p:nvSpPr>
+        </p:nvPicPr>
+        <p:blipFill>
+          <a:blip r:embed="rId4"/>
+          <a:stretch>
+            <a:fillRect/>
+          </a:stretch>
+        </p:blipFill>
         <p:spPr>
           <a:xfrm>
-            <a:off x="322173" y="464964"/>
-            <a:ext cx="356188" cy="400110"/>
+            <a:off x="5899702" y="74951"/>
+            <a:ext cx="5558984" cy="503945"/>
           </a:xfrm>
           <a:prstGeom prst="rect">
             <a:avLst/>
           </a:prstGeom>
-          <a:noFill/>
         </p:spPr>
-        <p:txBody>
-          <a:bodyPr wrap="none" rtlCol="0">
-            <a:spAutoFit/>
-          </a:bodyPr>
-          <a:lstStyle/>
-          <a:p>
-            <a:r>
-              <a:rPr lang="en-US" sz="2000" dirty="0">
-                <a:latin typeface="Arial" panose="020B0604020202020204" pitchFamily="34" charset="0"/>
-                <a:cs typeface="Arial" panose="020B0604020202020204" pitchFamily="34" charset="0"/>
-              </a:rPr>
-              <a:t>A</a:t>
-            </a:r>
-          </a:p>
-        </p:txBody>
-      </p:sp>
-      <p:sp>
-        <p:nvSpPr>
-          <p:cNvPr id="3" name="TextBox 2">
+      </p:pic>
+      <p:sp>
+        <p:nvSpPr>
+          <p:cNvPr id="9" name="Rectangle 8">
             <a:extLst>
               <a:ext uri="{FF2B5EF4-FFF2-40B4-BE49-F238E27FC236}">
-                <a16:creationId xmlns:a16="http://schemas.microsoft.com/office/drawing/2014/main" id="{7CBAADB1-5585-736D-563A-3E93AD096F15}"/>
+                <a16:creationId xmlns:a16="http://schemas.microsoft.com/office/drawing/2014/main" id="{81817CE1-B27E-4CC4-7DE1-0A00CF378C94}"/>
               </a:ext>
             </a:extLst>
           </p:cNvPr>
-          <p:cNvSpPr txBox="1"/>
+          <p:cNvSpPr/>
           <p:nvPr/>
         </p:nvSpPr>
         <p:spPr>
           <a:xfrm>
-            <a:off x="8679194" y="7191345"/>
-            <a:ext cx="341760" cy="400110"/>
+            <a:off x="6610865" y="578896"/>
+            <a:ext cx="4127157" cy="300019"/>
           </a:xfrm>
           <a:prstGeom prst="rect">
             <a:avLst/>
           </a:prstGeom>
-          <a:noFill/>
-        </p:spPr>
-        <p:txBody>
-          <a:bodyPr wrap="none" rtlCol="0">
-            <a:spAutoFit/>
-          </a:bodyPr>
-          <a:lstStyle/>
-          <a:p>
-            <a:r>
-              <a:rPr lang="en-US" sz="2000" dirty="0">
-                <a:latin typeface="Arial" panose="020B0604020202020204" pitchFamily="34" charset="0"/>
-                <a:cs typeface="Arial" panose="020B0604020202020204" pitchFamily="34" charset="0"/>
-              </a:rPr>
-              <a:t>F</a:t>
-            </a:r>
-          </a:p>
-        </p:txBody>
-      </p:sp>
-      <p:sp>
-        <p:nvSpPr>
-          <p:cNvPr id="4" name="TextBox 3">
-            <a:extLst>
-              <a:ext uri="{FF2B5EF4-FFF2-40B4-BE49-F238E27FC236}">
-                <a16:creationId xmlns:a16="http://schemas.microsoft.com/office/drawing/2014/main" id="{1995DD2D-D210-0BD3-C0BF-88970E4275EB}"/>
-              </a:ext>
-            </a:extLst>
-          </p:cNvPr>
-          <p:cNvSpPr txBox="1"/>
-          <p:nvPr/>
-        </p:nvSpPr>
-        <p:spPr>
-          <a:xfrm>
-            <a:off x="8680693" y="3840480"/>
-            <a:ext cx="356188" cy="400110"/>
-          </a:xfrm>
-          <a:prstGeom prst="rect">
-            <a:avLst/>
-          </a:prstGeom>
-          <a:noFill/>
-        </p:spPr>
-        <p:txBody>
-          <a:bodyPr wrap="none" rtlCol="0">
-            <a:spAutoFit/>
-          </a:bodyPr>
-          <a:lstStyle/>
-          <a:p>
-            <a:r>
-              <a:rPr lang="en-US" sz="2000" dirty="0">
-                <a:latin typeface="Arial" panose="020B0604020202020204" pitchFamily="34" charset="0"/>
-                <a:cs typeface="Arial" panose="020B0604020202020204" pitchFamily="34" charset="0"/>
-              </a:rPr>
-              <a:t>E</a:t>
-            </a:r>
-          </a:p>
-        </p:txBody>
-      </p:sp>
-      <p:sp>
-        <p:nvSpPr>
-          <p:cNvPr id="6" name="TextBox 5">
-            <a:extLst>
-              <a:ext uri="{FF2B5EF4-FFF2-40B4-BE49-F238E27FC236}">
-                <a16:creationId xmlns:a16="http://schemas.microsoft.com/office/drawing/2014/main" id="{C89F8798-F60C-D3ED-DA8A-3F1C07AF6A4F}"/>
-              </a:ext>
-            </a:extLst>
-          </p:cNvPr>
-          <p:cNvSpPr txBox="1"/>
-          <p:nvPr/>
-        </p:nvSpPr>
-        <p:spPr>
-          <a:xfrm>
-            <a:off x="8714853" y="464964"/>
-            <a:ext cx="370614" cy="400110"/>
-          </a:xfrm>
-          <a:prstGeom prst="rect">
-            <a:avLst/>
-          </a:prstGeom>
-          <a:noFill/>
-        </p:spPr>
-        <p:txBody>
-          <a:bodyPr wrap="none" rtlCol="0">
-            <a:spAutoFit/>
-          </a:bodyPr>
-          <a:lstStyle/>
-          <a:p>
-            <a:r>
-              <a:rPr lang="en-US" sz="2000" dirty="0">
-                <a:latin typeface="Arial" panose="020B0604020202020204" pitchFamily="34" charset="0"/>
-                <a:cs typeface="Arial" panose="020B0604020202020204" pitchFamily="34" charset="0"/>
-              </a:rPr>
-              <a:t>D</a:t>
-            </a:r>
-          </a:p>
-        </p:txBody>
-      </p:sp>
-      <p:sp>
-        <p:nvSpPr>
-          <p:cNvPr id="7" name="TextBox 6">
-            <a:extLst>
-              <a:ext uri="{FF2B5EF4-FFF2-40B4-BE49-F238E27FC236}">
-                <a16:creationId xmlns:a16="http://schemas.microsoft.com/office/drawing/2014/main" id="{1CC9737E-0380-0DC8-8278-9FF97AF9C833}"/>
-              </a:ext>
-            </a:extLst>
-          </p:cNvPr>
-          <p:cNvSpPr txBox="1"/>
-          <p:nvPr/>
-        </p:nvSpPr>
-        <p:spPr>
-          <a:xfrm>
-            <a:off x="314960" y="7191345"/>
-            <a:ext cx="370614" cy="400110"/>
-          </a:xfrm>
-          <a:prstGeom prst="rect">
-            <a:avLst/>
-          </a:prstGeom>
-          <a:noFill/>
-        </p:spPr>
-        <p:txBody>
-          <a:bodyPr wrap="none" rtlCol="0">
-            <a:spAutoFit/>
-          </a:bodyPr>
-          <a:lstStyle/>
-          <a:p>
-            <a:r>
-              <a:rPr lang="en-US" sz="2000" dirty="0">
-                <a:latin typeface="Arial" panose="020B0604020202020204" pitchFamily="34" charset="0"/>
-                <a:cs typeface="Arial" panose="020B0604020202020204" pitchFamily="34" charset="0"/>
-              </a:rPr>
-              <a:t>C</a:t>
-            </a:r>
-          </a:p>
-        </p:txBody>
-      </p:sp>
-      <p:sp>
-        <p:nvSpPr>
-          <p:cNvPr id="8" name="TextBox 7">
-            <a:extLst>
-              <a:ext uri="{FF2B5EF4-FFF2-40B4-BE49-F238E27FC236}">
-                <a16:creationId xmlns:a16="http://schemas.microsoft.com/office/drawing/2014/main" id="{2ACA91A2-C9D2-A85D-BA1B-166C6D4B90CB}"/>
-              </a:ext>
-            </a:extLst>
-          </p:cNvPr>
-          <p:cNvSpPr txBox="1"/>
-          <p:nvPr/>
-        </p:nvSpPr>
-        <p:spPr>
-          <a:xfrm>
-            <a:off x="322173" y="3840480"/>
-            <a:ext cx="356188" cy="400110"/>
-          </a:xfrm>
-          <a:prstGeom prst="rect">
-            <a:avLst/>
-          </a:prstGeom>
-          <a:noFill/>
-        </p:spPr>
-        <p:txBody>
-          <a:bodyPr wrap="none" rtlCol="0">
-            <a:spAutoFit/>
-          </a:bodyPr>
-          <a:lstStyle/>
-          <a:p>
-            <a:r>
-              <a:rPr lang="en-US" sz="2000" dirty="0">
-                <a:latin typeface="Arial" panose="020B0604020202020204" pitchFamily="34" charset="0"/>
-                <a:cs typeface="Arial" panose="020B0604020202020204" pitchFamily="34" charset="0"/>
-              </a:rPr>
-              <a:t>B</a:t>
-            </a:r>
-          </a:p>
-        </p:txBody>
-      </p:sp>
-      <p:cxnSp>
-        <p:nvCxnSpPr>
-          <p:cNvPr id="16" name="Straight Connector 15">
-            <a:extLst>
-              <a:ext uri="{FF2B5EF4-FFF2-40B4-BE49-F238E27FC236}">
-                <a16:creationId xmlns:a16="http://schemas.microsoft.com/office/drawing/2014/main" id="{B239EADA-9951-251F-81D4-4A1A88A37949}"/>
-              </a:ext>
-            </a:extLst>
-          </p:cNvPr>
-          <p:cNvCxnSpPr>
-            <a:cxnSpLocks/>
-          </p:cNvCxnSpPr>
-          <p:nvPr/>
-        </p:nvCxnSpPr>
-        <p:spPr>
-          <a:xfrm>
-            <a:off x="12306490" y="1010561"/>
-            <a:ext cx="1061134" cy="1519127"/>
-          </a:xfrm>
-          <a:prstGeom prst="line">
-            <a:avLst/>
-          </a:prstGeom>
-          <a:ln w="12700">
+          <a:solidFill>
+            <a:schemeClr val="bg1"/>
+          </a:solidFill>
+          <a:ln>
             <a:solidFill>
-              <a:schemeClr val="tx1"/>
+              <a:schemeClr val="bg1"/>
             </a:solidFill>
-            <a:prstDash val="dash"/>
-          </a:ln>
-        </p:spPr>
-        <p:style>
-          <a:lnRef idx="2">
-            <a:schemeClr val="accent1"/>
-          </a:lnRef>
-          <a:fillRef idx="0">
-            <a:schemeClr val="accent1"/>
-          </a:fillRef>
-          <a:effectRef idx="1">
-            <a:schemeClr val="accent1"/>
-          </a:effectRef>
-          <a:fontRef idx="minor">
-            <a:schemeClr val="tx1"/>
-          </a:fontRef>
-        </p:style>
-      </p:cxnSp>
-      <p:cxnSp>
-        <p:nvCxnSpPr>
-          <p:cNvPr id="17" name="Straight Connector 16">
-            <a:extLst>
-              <a:ext uri="{FF2B5EF4-FFF2-40B4-BE49-F238E27FC236}">
-                <a16:creationId xmlns:a16="http://schemas.microsoft.com/office/drawing/2014/main" id="{104CC5FE-37CA-8ACA-2A8E-2E1A5164ADBD}"/>
-              </a:ext>
-            </a:extLst>
-          </p:cNvPr>
-          <p:cNvCxnSpPr>
-            <a:cxnSpLocks/>
-          </p:cNvCxnSpPr>
-          <p:nvPr/>
-        </p:nvCxnSpPr>
-        <p:spPr>
-          <a:xfrm>
-            <a:off x="10067636" y="3064072"/>
-            <a:ext cx="2135817" cy="534385"/>
-          </a:xfrm>
-          <a:prstGeom prst="line">
-            <a:avLst/>
-          </a:prstGeom>
-          <a:ln w="12700">
-            <a:solidFill>
-              <a:schemeClr val="tx1"/>
-            </a:solidFill>
-            <a:prstDash val="dash"/>
-          </a:ln>
-        </p:spPr>
-        <p:style>
-          <a:lnRef idx="2">
-            <a:schemeClr val="accent1"/>
-          </a:lnRef>
-          <a:fillRef idx="0">
-            <a:schemeClr val="accent1"/>
-          </a:fillRef>
-          <a:effectRef idx="1">
-            <a:schemeClr val="accent1"/>
-          </a:effectRef>
-          <a:fontRef idx="minor">
-            <a:schemeClr val="tx1"/>
-          </a:fontRef>
-        </p:style>
-      </p:cxnSp>
-      <p:sp>
-        <p:nvSpPr>
-          <p:cNvPr id="19" name="Rectangle 18">
-            <a:extLst>
-              <a:ext uri="{FF2B5EF4-FFF2-40B4-BE49-F238E27FC236}">
-                <a16:creationId xmlns:a16="http://schemas.microsoft.com/office/drawing/2014/main" id="{6A711244-0850-75E9-5AAA-47445E71C37E}"/>
-              </a:ext>
-            </a:extLst>
-          </p:cNvPr>
-          <p:cNvSpPr>
-            <a:spLocks noChangeAspect="1"/>
-          </p:cNvSpPr>
-          <p:nvPr/>
-        </p:nvSpPr>
-        <p:spPr>
-          <a:xfrm>
-            <a:off x="12203453" y="2529688"/>
-            <a:ext cx="1164171" cy="1068769"/>
-          </a:xfrm>
-          <a:prstGeom prst="rect">
-            <a:avLst/>
-          </a:prstGeom>
-          <a:noFill/>
-          <a:ln w="12700">
-            <a:solidFill>
-              <a:schemeClr val="tx1"/>
-            </a:solidFill>
-            <a:prstDash val="dash"/>
           </a:ln>
         </p:spPr>
         <p:style>
@@ -4009,48 +4274,6 @@
           </a:p>
         </p:txBody>
       </p:sp>
-      <p:pic>
-        <p:nvPicPr>
-          <p:cNvPr id="12" name="Picture 11" descr="A diagram of a curve&#10;&#10;AI-generated content may be incorrect.">
-            <a:extLst>
-              <a:ext uri="{FF2B5EF4-FFF2-40B4-BE49-F238E27FC236}">
-                <a16:creationId xmlns:a16="http://schemas.microsoft.com/office/drawing/2014/main" id="{3EA8482E-177C-C72D-FB2D-8770CEF2A8A8}"/>
-              </a:ext>
-            </a:extLst>
-          </p:cNvPr>
-          <p:cNvPicPr>
-            <a:picLocks noChangeAspect="1"/>
-          </p:cNvPicPr>
-          <p:nvPr/>
-        </p:nvPicPr>
-        <p:blipFill>
-          <a:blip r:embed="rId5"/>
-          <a:stretch>
-            <a:fillRect/>
-          </a:stretch>
-        </p:blipFill>
-        <p:spPr>
-          <a:xfrm>
-            <a:off x="10067636" y="1010561"/>
-            <a:ext cx="2231898" cy="2045284"/>
-          </a:xfrm>
-          <a:prstGeom prst="rect">
-            <a:avLst/>
-          </a:prstGeom>
-          <a:ln>
-            <a:solidFill>
-              <a:schemeClr val="tx1"/>
-            </a:solidFill>
-          </a:ln>
-          <a:effectLst>
-            <a:outerShdw blurRad="50800" dist="38100" dir="2700000" algn="tl" rotWithShape="0">
-              <a:prstClr val="black">
-                <a:alpha val="40000"/>
-              </a:prstClr>
-            </a:outerShdw>
-          </a:effectLst>
-        </p:spPr>
-      </p:pic>
     </p:spTree>
     <p:extLst>
       <p:ext uri="{BB962C8B-B14F-4D97-AF65-F5344CB8AC3E}">

</xml_diff>

<commit_message>
Ran with updated version of wispack
</commit_message>
<xml_diff>
--- a/figs/fig_MCMCbs_comparison.pptx
+++ b/figs/fig_MCMCbs_comparison.pptx
@@ -115,7 +115,7 @@
 <file path=ppt/revisionInfo.xml><?xml version="1.0" encoding="utf-8"?>
 <p1510:revInfo xmlns:a="http://schemas.openxmlformats.org/drawingml/2006/main" xmlns:r="http://schemas.openxmlformats.org/officeDocument/2006/relationships" xmlns:p1510="http://schemas.microsoft.com/office/powerpoint/2015/10/main">
   <p1510:revLst>
-    <p1510:client id="{B0F65F1A-47D9-0541-A4E5-BE40BC898954}" v="467" dt="2025-06-03T22:36:01.097"/>
+    <p1510:client id="{987422F7-2C8A-0E49-BCD3-E878CE42A2A6}" v="3" dt="2025-06-09T15:12:56.458"/>
   </p1510:revLst>
 </p1510:revInfo>
 </file>
@@ -401,6 +401,38 @@
       </pc:sldMasterChg>
     </pc:docChg>
   </pc:docChgLst>
+  <pc:docChgLst>
+    <pc:chgData name="Barkasi, Michael" userId="604489e9-c8b5-4a18-ae0d-3a3e29c44efc" providerId="ADAL" clId="{987422F7-2C8A-0E49-BCD3-E878CE42A2A6}"/>
+    <pc:docChg chg="modSld">
+      <pc:chgData name="Barkasi, Michael" userId="604489e9-c8b5-4a18-ae0d-3a3e29c44efc" providerId="ADAL" clId="{987422F7-2C8A-0E49-BCD3-E878CE42A2A6}" dt="2025-06-09T15:12:56.458" v="2" actId="14826"/>
+      <pc:docMkLst>
+        <pc:docMk/>
+      </pc:docMkLst>
+      <pc:sldChg chg="modSp">
+        <pc:chgData name="Barkasi, Michael" userId="604489e9-c8b5-4a18-ae0d-3a3e29c44efc" providerId="ADAL" clId="{987422F7-2C8A-0E49-BCD3-E878CE42A2A6}" dt="2025-06-09T15:12:56.458" v="2" actId="14826"/>
+        <pc:sldMkLst>
+          <pc:docMk/>
+          <pc:sldMk cId="420047761" sldId="256"/>
+        </pc:sldMkLst>
+        <pc:picChg chg="mod">
+          <ac:chgData name="Barkasi, Michael" userId="604489e9-c8b5-4a18-ae0d-3a3e29c44efc" providerId="ADAL" clId="{987422F7-2C8A-0E49-BCD3-E878CE42A2A6}" dt="2025-06-09T15:12:56.458" v="2" actId="14826"/>
+          <ac:picMkLst>
+            <pc:docMk/>
+            <pc:sldMk cId="420047761" sldId="256"/>
+            <ac:picMk id="14" creationId="{EE8604EA-47B3-721D-5BFC-5A7FDE7E3BAF}"/>
+          </ac:picMkLst>
+        </pc:picChg>
+        <pc:picChg chg="mod">
+          <ac:chgData name="Barkasi, Michael" userId="604489e9-c8b5-4a18-ae0d-3a3e29c44efc" providerId="ADAL" clId="{987422F7-2C8A-0E49-BCD3-E878CE42A2A6}" dt="2025-06-09T15:12:39.203" v="1" actId="167"/>
+          <ac:picMkLst>
+            <pc:docMk/>
+            <pc:sldMk cId="420047761" sldId="256"/>
+            <ac:picMk id="25" creationId="{0C869B22-4AEF-7F03-A48A-7069BF0FE132}"/>
+          </ac:picMkLst>
+        </pc:picChg>
+      </pc:sldChg>
+    </pc:docChg>
+  </pc:docChgLst>
 </pc:chgInfo>
 </file>
 
@@ -535,7 +567,7 @@
           <a:p>
             <a:fld id="{A66A2E94-B547-E748-9FAE-0669CBE3935E}" type="datetimeFigureOut">
               <a:rPr lang="en-US" smtClean="0"/>
-              <a:t>6/3/25</a:t>
+              <a:t>6/9/25</a:t>
             </a:fld>
             <a:endParaRPr lang="en-US"/>
           </a:p>
@@ -705,7 +737,7 @@
           <a:p>
             <a:fld id="{A66A2E94-B547-E748-9FAE-0669CBE3935E}" type="datetimeFigureOut">
               <a:rPr lang="en-US" smtClean="0"/>
-              <a:t>6/3/25</a:t>
+              <a:t>6/9/25</a:t>
             </a:fld>
             <a:endParaRPr lang="en-US"/>
           </a:p>
@@ -885,7 +917,7 @@
           <a:p>
             <a:fld id="{A66A2E94-B547-E748-9FAE-0669CBE3935E}" type="datetimeFigureOut">
               <a:rPr lang="en-US" smtClean="0"/>
-              <a:t>6/3/25</a:t>
+              <a:t>6/9/25</a:t>
             </a:fld>
             <a:endParaRPr lang="en-US"/>
           </a:p>
@@ -1055,7 +1087,7 @@
           <a:p>
             <a:fld id="{A66A2E94-B547-E748-9FAE-0669CBE3935E}" type="datetimeFigureOut">
               <a:rPr lang="en-US" smtClean="0"/>
-              <a:t>6/3/25</a:t>
+              <a:t>6/9/25</a:t>
             </a:fld>
             <a:endParaRPr lang="en-US"/>
           </a:p>
@@ -1301,7 +1333,7 @@
           <a:p>
             <a:fld id="{A66A2E94-B547-E748-9FAE-0669CBE3935E}" type="datetimeFigureOut">
               <a:rPr lang="en-US" smtClean="0"/>
-              <a:t>6/3/25</a:t>
+              <a:t>6/9/25</a:t>
             </a:fld>
             <a:endParaRPr lang="en-US"/>
           </a:p>
@@ -1533,7 +1565,7 @@
           <a:p>
             <a:fld id="{A66A2E94-B547-E748-9FAE-0669CBE3935E}" type="datetimeFigureOut">
               <a:rPr lang="en-US" smtClean="0"/>
-              <a:t>6/3/25</a:t>
+              <a:t>6/9/25</a:t>
             </a:fld>
             <a:endParaRPr lang="en-US"/>
           </a:p>
@@ -1900,7 +1932,7 @@
           <a:p>
             <a:fld id="{A66A2E94-B547-E748-9FAE-0669CBE3935E}" type="datetimeFigureOut">
               <a:rPr lang="en-US" smtClean="0"/>
-              <a:t>6/3/25</a:t>
+              <a:t>6/9/25</a:t>
             </a:fld>
             <a:endParaRPr lang="en-US"/>
           </a:p>
@@ -2018,7 +2050,7 @@
           <a:p>
             <a:fld id="{A66A2E94-B547-E748-9FAE-0669CBE3935E}" type="datetimeFigureOut">
               <a:rPr lang="en-US" smtClean="0"/>
-              <a:t>6/3/25</a:t>
+              <a:t>6/9/25</a:t>
             </a:fld>
             <a:endParaRPr lang="en-US"/>
           </a:p>
@@ -2113,7 +2145,7 @@
           <a:p>
             <a:fld id="{A66A2E94-B547-E748-9FAE-0669CBE3935E}" type="datetimeFigureOut">
               <a:rPr lang="en-US" smtClean="0"/>
-              <a:t>6/3/25</a:t>
+              <a:t>6/9/25</a:t>
             </a:fld>
             <a:endParaRPr lang="en-US"/>
           </a:p>
@@ -2390,7 +2422,7 @@
           <a:p>
             <a:fld id="{A66A2E94-B547-E748-9FAE-0669CBE3935E}" type="datetimeFigureOut">
               <a:rPr lang="en-US" smtClean="0"/>
-              <a:t>6/3/25</a:t>
+              <a:t>6/9/25</a:t>
             </a:fld>
             <a:endParaRPr lang="en-US"/>
           </a:p>
@@ -2647,7 +2679,7 @@
           <a:p>
             <a:fld id="{A66A2E94-B547-E748-9FAE-0669CBE3935E}" type="datetimeFigureOut">
               <a:rPr lang="en-US" smtClean="0"/>
-              <a:t>6/3/25</a:t>
+              <a:t>6/9/25</a:t>
             </a:fld>
             <a:endParaRPr lang="en-US"/>
           </a:p>
@@ -2860,7 +2892,7 @@
           <a:p>
             <a:fld id="{A66A2E94-B547-E748-9FAE-0669CBE3935E}" type="datetimeFigureOut">
               <a:rPr lang="en-US" smtClean="0"/>
-              <a:t>6/3/25</a:t>
+              <a:t>6/9/25</a:t>
             </a:fld>
             <a:endParaRPr lang="en-US"/>
           </a:p>
@@ -3286,8 +3318,8 @@
         </p:blipFill>
         <p:spPr>
           <a:xfrm>
-            <a:off x="295726" y="590822"/>
-            <a:ext cx="16766935" cy="10619058"/>
+            <a:off x="295727" y="590822"/>
+            <a:ext cx="16766933" cy="10619058"/>
           </a:xfrm>
           <a:prstGeom prst="rect">
             <a:avLst/>
@@ -3998,8 +4030,8 @@
         </p:blipFill>
         <p:spPr>
           <a:xfrm>
-            <a:off x="11808371" y="1566488"/>
-            <a:ext cx="3169985" cy="1768380"/>
+            <a:off x="11907653" y="1566488"/>
+            <a:ext cx="2971421" cy="1768380"/>
           </a:xfrm>
           <a:prstGeom prst="rect">
             <a:avLst/>

</xml_diff>